<commit_message>
Guided Capstone Presentation Slides
</commit_message>
<xml_diff>
--- a/Reports/Guided Capstone Presentation.pptx
+++ b/Reports/Guided Capstone Presentation.pptx
@@ -5,14 +5,17 @@
     <p:sldMasterId id="2147483660" r:id="rId4"/>
   </p:sldMasterIdLst>
   <p:notesMasterIdLst>
-    <p:notesMasterId r:id="rId10"/>
+    <p:notesMasterId r:id="rId13"/>
   </p:notesMasterIdLst>
   <p:sldIdLst>
     <p:sldId id="278" r:id="rId5"/>
     <p:sldId id="284" r:id="rId6"/>
     <p:sldId id="286" r:id="rId7"/>
-    <p:sldId id="282" r:id="rId8"/>
-    <p:sldId id="285" r:id="rId9"/>
+    <p:sldId id="293" r:id="rId8"/>
+    <p:sldId id="290" r:id="rId9"/>
+    <p:sldId id="291" r:id="rId10"/>
+    <p:sldId id="294" r:id="rId11"/>
+    <p:sldId id="285" r:id="rId12"/>
   </p:sldIdLst>
   <p:sldSz cx="12192000" cy="6858000"/>
   <p:notesSz cx="6858000" cy="9144000"/>
@@ -201,7 +204,7 @@
           <a:p>
             <a:fld id="{AFD01546-198A-4195-BCF8-F0FF54C90E5E}" type="datetimeFigureOut">
               <a:rPr lang="en-US" smtClean="0"/>
-              <a:t>2/3/2021</a:t>
+              <a:t>2/4/2021</a:t>
             </a:fld>
             <a:endParaRPr lang="en-US" dirty="0"/>
           </a:p>
@@ -653,7 +656,7 @@
           <a:p>
             <a:fld id="{88D38747-4367-4BD2-8D51-C97E202738E2}" type="datetime1">
               <a:rPr lang="en-US" smtClean="0"/>
-              <a:t>2/3/2021</a:t>
+              <a:t>2/4/2021</a:t>
             </a:fld>
             <a:endParaRPr lang="en-US" dirty="0"/>
           </a:p>
@@ -958,7 +961,7 @@
           <a:p>
             <a:fld id="{11F1B079-7EF0-44EE-B798-BCC497C9F3B2}" type="datetime1">
               <a:rPr lang="en-US" smtClean="0"/>
-              <a:t>2/3/2021</a:t>
+              <a:t>2/4/2021</a:t>
             </a:fld>
             <a:endParaRPr lang="en-US" dirty="0"/>
           </a:p>
@@ -1152,7 +1155,7 @@
           <a:p>
             <a:fld id="{28FF70A8-1D13-4657-95F0-A9EA54967B8D}" type="datetime1">
               <a:rPr lang="en-US" smtClean="0"/>
-              <a:t>2/3/2021</a:t>
+              <a:t>2/4/2021</a:t>
             </a:fld>
             <a:endParaRPr lang="en-US" dirty="0"/>
           </a:p>
@@ -1415,7 +1418,7 @@
           <a:p>
             <a:fld id="{21EB90AC-71BD-4C7F-8ACA-7B3F18292E63}" type="datetime1">
               <a:rPr lang="en-US" smtClean="0"/>
-              <a:t>2/3/2021</a:t>
+              <a:t>2/4/2021</a:t>
             </a:fld>
             <a:endParaRPr lang="en-US" dirty="0"/>
           </a:p>
@@ -1851,7 +1854,7 @@
           <a:p>
             <a:fld id="{4E6EFC2C-8905-46F0-B443-CE905B76BA01}" type="datetime1">
               <a:rPr lang="en-US" smtClean="0"/>
-              <a:t>2/3/2021</a:t>
+              <a:t>2/4/2021</a:t>
             </a:fld>
             <a:endParaRPr lang="en-US" dirty="0"/>
           </a:p>
@@ -2388,7 +2391,7 @@
           <a:p>
             <a:fld id="{D9079DC3-C9B5-499E-9140-0DC28B7074E2}" type="datetime1">
               <a:rPr lang="en-US" smtClean="0"/>
-              <a:t>2/3/2021</a:t>
+              <a:t>2/4/2021</a:t>
             </a:fld>
             <a:endParaRPr lang="en-US" dirty="0"/>
           </a:p>
@@ -3270,7 +3273,7 @@
           <a:p>
             <a:fld id="{30BB33EA-E472-4D22-9C03-A9C14AA21CED}" type="datetime1">
               <a:rPr lang="en-US" smtClean="0"/>
-              <a:t>2/3/2021</a:t>
+              <a:t>2/4/2021</a:t>
             </a:fld>
             <a:endParaRPr lang="en-US" dirty="0"/>
           </a:p>
@@ -3440,7 +3443,7 @@
           <a:p>
             <a:fld id="{73C55A3C-5767-4844-A0A3-83778C2E5409}" type="datetime1">
               <a:rPr lang="en-US" smtClean="0"/>
-              <a:t>2/3/2021</a:t>
+              <a:t>2/4/2021</a:t>
             </a:fld>
             <a:endParaRPr lang="en-US" dirty="0"/>
           </a:p>
@@ -3684,7 +3687,7 @@
           <a:p>
             <a:fld id="{CAE507A8-A5CF-4D38-AB86-7EDDA87A85D4}" type="datetime1">
               <a:rPr lang="en-US" smtClean="0"/>
-              <a:t>2/3/2021</a:t>
+              <a:t>2/4/2021</a:t>
             </a:fld>
             <a:endParaRPr lang="en-US" dirty="0"/>
           </a:p>
@@ -3926,7 +3929,7 @@
           <a:p>
             <a:fld id="{BDFCD27C-8599-43EF-BA1D-14DDC1946E06}" type="datetime1">
               <a:rPr lang="en-US" smtClean="0"/>
-              <a:t>2/3/2021</a:t>
+              <a:t>2/4/2021</a:t>
             </a:fld>
             <a:endParaRPr lang="en-US" dirty="0"/>
           </a:p>
@@ -4409,7 +4412,7 @@
           <a:p>
             <a:fld id="{49343D99-809A-49C0-96E5-4250D0B498EE}" type="datetime1">
               <a:rPr lang="en-US" smtClean="0"/>
-              <a:t>2/3/2021</a:t>
+              <a:t>2/4/2021</a:t>
             </a:fld>
             <a:endParaRPr lang="en-US" dirty="0"/>
           </a:p>
@@ -4527,7 +4530,7 @@
           <a:p>
             <a:fld id="{A143DE9B-B678-4EFB-BB7D-A4370204A0B0}" type="datetime1">
               <a:rPr lang="en-US" smtClean="0"/>
-              <a:t>2/3/2021</a:t>
+              <a:t>2/4/2021</a:t>
             </a:fld>
             <a:endParaRPr lang="en-US" dirty="0"/>
           </a:p>
@@ -4622,7 +4625,7 @@
           <a:p>
             <a:fld id="{E68812DA-F765-4142-A6A3-A8ED7235E082}" type="datetime1">
               <a:rPr lang="en-US" smtClean="0"/>
-              <a:t>2/3/2021</a:t>
+              <a:t>2/4/2021</a:t>
             </a:fld>
             <a:endParaRPr lang="en-US" dirty="0"/>
           </a:p>
@@ -4877,7 +4880,7 @@
           <a:p>
             <a:fld id="{3E0277FD-7DE6-41D4-930D-AC99F5AFE54E}" type="datetime1">
               <a:rPr lang="en-US" smtClean="0"/>
-              <a:t>2/3/2021</a:t>
+              <a:t>2/4/2021</a:t>
             </a:fld>
             <a:endParaRPr lang="en-US" dirty="0"/>
           </a:p>
@@ -5184,7 +5187,7 @@
           <a:p>
             <a:fld id="{9EA15526-7079-4B7B-987C-1B5FAE11A0FF}" type="datetime1">
               <a:rPr lang="en-US" smtClean="0"/>
-              <a:t>2/3/2021</a:t>
+              <a:t>2/4/2021</a:t>
             </a:fld>
             <a:endParaRPr lang="en-US" dirty="0"/>
           </a:p>
@@ -5419,7 +5422,7 @@
           <a:p>
             <a:fld id="{073ED0CC-082F-4160-86E5-0D6041F12778}" type="datetime1">
               <a:rPr lang="en-US" smtClean="0"/>
-              <a:t>2/3/2021</a:t>
+              <a:t>2/4/2021</a:t>
             </a:fld>
             <a:endParaRPr lang="en-US" dirty="0"/>
           </a:p>
@@ -6337,7 +6340,7 @@
           </a:effectLst>
           <a:extLst>
             <a:ext uri="{91240B29-F687-4f45-9708-019B960494DF}">
-              <a14:hiddenLine xmlns="" xmlns:a14="http://schemas.microsoft.com/office/drawing/2010/main" xmlns:p14="http://schemas.microsoft.com/office/powerpoint/2010/main" xmlns:a16="http://schemas.microsoft.com/office/drawing/2014/main" w="9525">
+              <a14:hiddenLine xmlns:a16="http://schemas.microsoft.com/office/drawing/2014/main" xmlns:p14="http://schemas.microsoft.com/office/powerpoint/2010/main" xmlns:a14="http://schemas.microsoft.com/office/drawing/2010/main" xmlns="" w="9525">
                 <a:solidFill>
                   <a:srgbClr val="000000"/>
                 </a:solidFill>
@@ -6731,7 +6734,7 @@
               <a:rPr lang="en-US" sz="2400" b="1" dirty="0">
                 <a:latin typeface="Abadi" panose="020B0604020104020204" pitchFamily="34" charset="0"/>
               </a:rPr>
-              <a:t>Increase company revenue by x% by end of next ski season</a:t>
+              <a:t>Increase company revenue by end of next ski season</a:t>
             </a:r>
           </a:p>
         </p:txBody>
@@ -7527,7 +7530,7 @@
           <a:p>
             <a:r>
               <a:rPr lang="en-US" dirty="0"/>
-              <a:t>Recommendation &amp; Key Finding</a:t>
+              <a:t>Key Finding &amp; Recommendation</a:t>
             </a:r>
           </a:p>
         </p:txBody>
@@ -7548,12 +7551,529 @@
             <p:ph idx="1"/>
           </p:nvPr>
         </p:nvSpPr>
-        <p:spPr/>
-        <p:txBody>
-          <a:bodyPr/>
+        <p:spPr>
+          <a:xfrm>
+            <a:off x="399128" y="1953099"/>
+            <a:ext cx="7848760" cy="4447701"/>
+          </a:xfrm>
+        </p:spPr>
+        <p:txBody>
+          <a:bodyPr>
+            <a:normAutofit fontScale="92500" lnSpcReduction="10000"/>
+          </a:bodyPr>
           <a:lstStyle/>
           <a:p>
-            <a:endParaRPr lang="en-US"/>
+            <a:pPr marL="36900" indent="0" algn="ctr">
+              <a:buNone/>
+            </a:pPr>
+            <a:endParaRPr lang="en-US" dirty="0"/>
+          </a:p>
+          <a:p>
+            <a:pPr marL="36900" indent="0" algn="ctr">
+              <a:buNone/>
+            </a:pPr>
+            <a:endParaRPr lang="en-US" dirty="0"/>
+          </a:p>
+          <a:p>
+            <a:pPr marL="36900" indent="0">
+              <a:buNone/>
+            </a:pPr>
+            <a:r>
+              <a:rPr lang="en-US" i="1" dirty="0"/>
+              <a:t>The following changes are also recommended:</a:t>
+            </a:r>
+          </a:p>
+          <a:p>
+            <a:r>
+              <a:rPr lang="en-US" dirty="0"/>
+              <a:t>Increase vertical drop, add chair lift</a:t>
+            </a:r>
+          </a:p>
+          <a:p>
+            <a:pPr lvl="1"/>
+            <a:r>
+              <a:rPr lang="en-US" dirty="0"/>
+              <a:t>Supports additional ticket price increase of $2, ~3.5 Million added revenue</a:t>
+            </a:r>
+          </a:p>
+          <a:p>
+            <a:pPr lvl="1"/>
+            <a:r>
+              <a:rPr lang="en-US" dirty="0"/>
+              <a:t>Depends on cost of extra lift</a:t>
+            </a:r>
+          </a:p>
+          <a:p>
+            <a:r>
+              <a:rPr lang="en-US" dirty="0"/>
+              <a:t>Close at least 1 run </a:t>
+            </a:r>
+          </a:p>
+          <a:p>
+            <a:pPr lvl="1"/>
+            <a:r>
+              <a:rPr lang="en-US" dirty="0"/>
+              <a:t>Closure of 1 run has negligible effect on ticket price</a:t>
+            </a:r>
+          </a:p>
+          <a:p>
+            <a:pPr lvl="1"/>
+            <a:r>
+              <a:rPr lang="en-US" dirty="0"/>
+              <a:t>Closure of 10 runs drops ticket price projection by $1.75, intermediate numbers should be considered against operation cost </a:t>
+            </a:r>
+          </a:p>
+          <a:p>
+            <a:pPr lvl="1"/>
+            <a:endParaRPr lang="en-US" dirty="0"/>
+          </a:p>
+          <a:p>
+            <a:pPr lvl="1"/>
+            <a:endParaRPr lang="en-US" dirty="0"/>
+          </a:p>
+        </p:txBody>
+      </p:sp>
+      <p:pic>
+        <p:nvPicPr>
+          <p:cNvPr id="5" name="Picture 4">
+            <a:extLst>
+              <a:ext uri="{FF2B5EF4-FFF2-40B4-BE49-F238E27FC236}">
+                <a16:creationId xmlns:a16="http://schemas.microsoft.com/office/drawing/2014/main" id="{9677E213-165D-4BA5-9CDB-F32D48512A6A}"/>
+              </a:ext>
+            </a:extLst>
+          </p:cNvPr>
+          <p:cNvPicPr>
+            <a:picLocks noChangeAspect="1"/>
+          </p:cNvPicPr>
+          <p:nvPr/>
+        </p:nvPicPr>
+        <p:blipFill>
+          <a:blip r:embed="rId2"/>
+          <a:stretch>
+            <a:fillRect/>
+          </a:stretch>
+        </p:blipFill>
+        <p:spPr>
+          <a:xfrm>
+            <a:off x="8174038" y="2897606"/>
+            <a:ext cx="3351174" cy="3553953"/>
+          </a:xfrm>
+          <a:prstGeom prst="rect">
+            <a:avLst/>
+          </a:prstGeom>
+        </p:spPr>
+      </p:pic>
+      <p:sp>
+        <p:nvSpPr>
+          <p:cNvPr id="6" name="Content Placeholder 2">
+            <a:extLst>
+              <a:ext uri="{FF2B5EF4-FFF2-40B4-BE49-F238E27FC236}">
+                <a16:creationId xmlns:a16="http://schemas.microsoft.com/office/drawing/2014/main" id="{94C7BF94-EF4C-491A-B6BC-30970E53991E}"/>
+              </a:ext>
+            </a:extLst>
+          </p:cNvPr>
+          <p:cNvSpPr txBox="1">
+            <a:spLocks/>
+          </p:cNvSpPr>
+          <p:nvPr/>
+        </p:nvSpPr>
+        <p:spPr>
+          <a:xfrm>
+            <a:off x="545431" y="1689906"/>
+            <a:ext cx="11077073" cy="1121501"/>
+          </a:xfrm>
+          <a:prstGeom prst="rect">
+            <a:avLst/>
+          </a:prstGeom>
+          <a:effectLst>
+            <a:outerShdw blurRad="25400" dir="17880000">
+              <a:srgbClr val="000000">
+                <a:alpha val="46000"/>
+              </a:srgbClr>
+            </a:outerShdw>
+          </a:effectLst>
+        </p:spPr>
+        <p:txBody>
+          <a:bodyPr vert="horz" lIns="91440" tIns="45720" rIns="91440" bIns="45720" rtlCol="0" anchor="t">
+            <a:normAutofit fontScale="92500" lnSpcReduction="20000"/>
+          </a:bodyPr>
+          <a:lstStyle>
+            <a:lvl1pPr marL="342900" indent="-306000" algn="l" defTabSz="457200" rtl="0" eaLnBrk="1" latinLnBrk="0" hangingPunct="1">
+              <a:lnSpc>
+                <a:spcPct val="110000"/>
+              </a:lnSpc>
+              <a:spcBef>
+                <a:spcPct val="20000"/>
+              </a:spcBef>
+              <a:spcAft>
+                <a:spcPts val="600"/>
+              </a:spcAft>
+              <a:buClr>
+                <a:schemeClr val="tx2"/>
+              </a:buClr>
+              <a:buSzPct val="70000"/>
+              <a:buFont typeface="Wingdings 2" charset="2"/>
+              <a:buChar char=""/>
+              <a:defRPr sz="2300" kern="1200">
+                <a:ln>
+                  <a:solidFill>
+                    <a:schemeClr val="bg1">
+                      <a:lumMod val="75000"/>
+                      <a:lumOff val="25000"/>
+                      <a:alpha val="10000"/>
+                    </a:schemeClr>
+                  </a:solidFill>
+                </a:ln>
+                <a:solidFill>
+                  <a:schemeClr val="tx2"/>
+                </a:solidFill>
+                <a:effectLst>
+                  <a:outerShdw blurRad="9525" dist="25400" dir="14640000" algn="tl" rotWithShape="0">
+                    <a:schemeClr val="bg1">
+                      <a:alpha val="30000"/>
+                    </a:schemeClr>
+                  </a:outerShdw>
+                </a:effectLst>
+                <a:latin typeface="+mn-lt"/>
+                <a:ea typeface="+mn-ea"/>
+                <a:cs typeface="+mn-cs"/>
+              </a:defRPr>
+            </a:lvl1pPr>
+            <a:lvl2pPr marL="720000" indent="-270000" algn="l" defTabSz="457200" rtl="0" eaLnBrk="1" latinLnBrk="0" hangingPunct="1">
+              <a:spcBef>
+                <a:spcPct val="20000"/>
+              </a:spcBef>
+              <a:spcAft>
+                <a:spcPts val="600"/>
+              </a:spcAft>
+              <a:buClr>
+                <a:schemeClr val="tx2"/>
+              </a:buClr>
+              <a:buSzPct val="70000"/>
+              <a:buFont typeface="Wingdings 2" charset="2"/>
+              <a:buChar char=""/>
+              <a:defRPr sz="2100" kern="1200">
+                <a:ln>
+                  <a:solidFill>
+                    <a:schemeClr val="bg1">
+                      <a:lumMod val="75000"/>
+                      <a:lumOff val="25000"/>
+                      <a:alpha val="10000"/>
+                    </a:schemeClr>
+                  </a:solidFill>
+                </a:ln>
+                <a:solidFill>
+                  <a:schemeClr val="tx2"/>
+                </a:solidFill>
+                <a:effectLst>
+                  <a:outerShdw blurRad="9525" dist="25400" dir="14640000" algn="tl" rotWithShape="0">
+                    <a:schemeClr val="bg1">
+                      <a:alpha val="30000"/>
+                    </a:schemeClr>
+                  </a:outerShdw>
+                </a:effectLst>
+                <a:latin typeface="+mn-lt"/>
+                <a:ea typeface="+mn-ea"/>
+                <a:cs typeface="+mn-cs"/>
+              </a:defRPr>
+            </a:lvl2pPr>
+            <a:lvl3pPr marL="1026000" indent="-216000" algn="l" defTabSz="457200" rtl="0" eaLnBrk="1" latinLnBrk="0" hangingPunct="1">
+              <a:spcBef>
+                <a:spcPct val="20000"/>
+              </a:spcBef>
+              <a:spcAft>
+                <a:spcPts val="600"/>
+              </a:spcAft>
+              <a:buClr>
+                <a:schemeClr val="tx2"/>
+              </a:buClr>
+              <a:buSzPct val="70000"/>
+              <a:buFont typeface="Wingdings 2" charset="2"/>
+              <a:buChar char=""/>
+              <a:defRPr sz="1800" kern="1200">
+                <a:ln>
+                  <a:solidFill>
+                    <a:schemeClr val="bg1">
+                      <a:lumMod val="75000"/>
+                      <a:lumOff val="25000"/>
+                      <a:alpha val="10000"/>
+                    </a:schemeClr>
+                  </a:solidFill>
+                </a:ln>
+                <a:solidFill>
+                  <a:schemeClr val="tx2"/>
+                </a:solidFill>
+                <a:effectLst>
+                  <a:outerShdw blurRad="9525" dist="25400" dir="14640000" algn="tl" rotWithShape="0">
+                    <a:schemeClr val="bg1">
+                      <a:alpha val="30000"/>
+                    </a:schemeClr>
+                  </a:outerShdw>
+                </a:effectLst>
+                <a:latin typeface="+mn-lt"/>
+                <a:ea typeface="+mn-ea"/>
+                <a:cs typeface="+mn-cs"/>
+              </a:defRPr>
+            </a:lvl3pPr>
+            <a:lvl4pPr marL="1386000" indent="-216000" algn="l" defTabSz="457200" rtl="0" eaLnBrk="1" latinLnBrk="0" hangingPunct="1">
+              <a:spcBef>
+                <a:spcPct val="20000"/>
+              </a:spcBef>
+              <a:spcAft>
+                <a:spcPts val="600"/>
+              </a:spcAft>
+              <a:buClr>
+                <a:schemeClr val="tx2"/>
+              </a:buClr>
+              <a:buSzPct val="70000"/>
+              <a:buFont typeface="Wingdings 2" charset="2"/>
+              <a:buChar char=""/>
+              <a:defRPr sz="1600" kern="1200">
+                <a:ln>
+                  <a:solidFill>
+                    <a:schemeClr val="bg1">
+                      <a:lumMod val="75000"/>
+                      <a:lumOff val="25000"/>
+                      <a:alpha val="10000"/>
+                    </a:schemeClr>
+                  </a:solidFill>
+                </a:ln>
+                <a:solidFill>
+                  <a:schemeClr val="tx2"/>
+                </a:solidFill>
+                <a:effectLst>
+                  <a:outerShdw blurRad="9525" dist="25400" dir="14640000" algn="tl" rotWithShape="0">
+                    <a:schemeClr val="bg1">
+                      <a:alpha val="30000"/>
+                    </a:schemeClr>
+                  </a:outerShdw>
+                </a:effectLst>
+                <a:latin typeface="+mn-lt"/>
+                <a:ea typeface="+mn-ea"/>
+                <a:cs typeface="+mn-cs"/>
+              </a:defRPr>
+            </a:lvl4pPr>
+            <a:lvl5pPr marL="1674000" indent="-216000" algn="l" defTabSz="457200" rtl="0" eaLnBrk="1" latinLnBrk="0" hangingPunct="1">
+              <a:spcBef>
+                <a:spcPct val="20000"/>
+              </a:spcBef>
+              <a:spcAft>
+                <a:spcPts val="600"/>
+              </a:spcAft>
+              <a:buClr>
+                <a:schemeClr val="tx2"/>
+              </a:buClr>
+              <a:buSzPct val="70000"/>
+              <a:buFont typeface="Wingdings 2" charset="2"/>
+              <a:buChar char=""/>
+              <a:defRPr sz="1600" kern="1200">
+                <a:ln>
+                  <a:solidFill>
+                    <a:schemeClr val="bg1">
+                      <a:lumMod val="75000"/>
+                      <a:lumOff val="25000"/>
+                      <a:alpha val="10000"/>
+                    </a:schemeClr>
+                  </a:solidFill>
+                </a:ln>
+                <a:solidFill>
+                  <a:schemeClr val="tx2"/>
+                </a:solidFill>
+                <a:effectLst>
+                  <a:outerShdw blurRad="9525" dist="25400" dir="14640000" algn="tl" rotWithShape="0">
+                    <a:schemeClr val="bg1">
+                      <a:alpha val="30000"/>
+                    </a:schemeClr>
+                  </a:outerShdw>
+                </a:effectLst>
+                <a:latin typeface="+mn-lt"/>
+                <a:ea typeface="+mn-ea"/>
+                <a:cs typeface="+mn-cs"/>
+              </a:defRPr>
+            </a:lvl5pPr>
+            <a:lvl6pPr marL="2014600" indent="-228600" algn="l" defTabSz="457200" rtl="0" eaLnBrk="1" latinLnBrk="0" hangingPunct="1">
+              <a:spcBef>
+                <a:spcPct val="20000"/>
+              </a:spcBef>
+              <a:spcAft>
+                <a:spcPts val="600"/>
+              </a:spcAft>
+              <a:buClr>
+                <a:schemeClr val="tx2"/>
+              </a:buClr>
+              <a:buSzPct val="70000"/>
+              <a:buFont typeface="Wingdings 2" charset="2"/>
+              <a:buChar char=""/>
+              <a:defRPr sz="1400" kern="1200">
+                <a:ln>
+                  <a:solidFill>
+                    <a:schemeClr val="bg1">
+                      <a:lumMod val="75000"/>
+                      <a:lumOff val="25000"/>
+                      <a:alpha val="10000"/>
+                    </a:schemeClr>
+                  </a:solidFill>
+                </a:ln>
+                <a:solidFill>
+                  <a:schemeClr val="tx2"/>
+                </a:solidFill>
+                <a:effectLst>
+                  <a:outerShdw blurRad="9525" dist="25400" dir="14640000" algn="tl" rotWithShape="0">
+                    <a:schemeClr val="bg1">
+                      <a:alpha val="30000"/>
+                    </a:schemeClr>
+                  </a:outerShdw>
+                </a:effectLst>
+                <a:latin typeface="+mn-lt"/>
+                <a:ea typeface="+mn-ea"/>
+                <a:cs typeface="+mn-cs"/>
+              </a:defRPr>
+            </a:lvl6pPr>
+            <a:lvl7pPr marL="2401800" indent="-228600" algn="l" defTabSz="457200" rtl="0" eaLnBrk="1" latinLnBrk="0" hangingPunct="1">
+              <a:spcBef>
+                <a:spcPct val="20000"/>
+              </a:spcBef>
+              <a:spcAft>
+                <a:spcPts val="600"/>
+              </a:spcAft>
+              <a:buClr>
+                <a:schemeClr val="tx2"/>
+              </a:buClr>
+              <a:buSzPct val="70000"/>
+              <a:buFont typeface="Wingdings 2" charset="2"/>
+              <a:buChar char=""/>
+              <a:defRPr sz="1400" kern="1200">
+                <a:ln>
+                  <a:solidFill>
+                    <a:schemeClr val="bg1">
+                      <a:lumMod val="75000"/>
+                      <a:lumOff val="25000"/>
+                      <a:alpha val="10000"/>
+                    </a:schemeClr>
+                  </a:solidFill>
+                </a:ln>
+                <a:solidFill>
+                  <a:schemeClr val="tx2"/>
+                </a:solidFill>
+                <a:effectLst>
+                  <a:outerShdw blurRad="9525" dist="25400" dir="14640000" algn="tl" rotWithShape="0">
+                    <a:schemeClr val="bg1">
+                      <a:alpha val="30000"/>
+                    </a:schemeClr>
+                  </a:outerShdw>
+                </a:effectLst>
+                <a:latin typeface="+mn-lt"/>
+                <a:ea typeface="+mn-ea"/>
+                <a:cs typeface="+mn-cs"/>
+              </a:defRPr>
+            </a:lvl7pPr>
+            <a:lvl8pPr marL="2789000" indent="-228600" algn="l" defTabSz="457200" rtl="0" eaLnBrk="1" latinLnBrk="0" hangingPunct="1">
+              <a:spcBef>
+                <a:spcPct val="20000"/>
+              </a:spcBef>
+              <a:spcAft>
+                <a:spcPts val="600"/>
+              </a:spcAft>
+              <a:buClr>
+                <a:schemeClr val="tx2"/>
+              </a:buClr>
+              <a:buSzPct val="70000"/>
+              <a:buFont typeface="Wingdings 2" charset="2"/>
+              <a:buChar char=""/>
+              <a:defRPr sz="1400" kern="1200">
+                <a:ln>
+                  <a:solidFill>
+                    <a:schemeClr val="bg1">
+                      <a:lumMod val="75000"/>
+                      <a:lumOff val="25000"/>
+                      <a:alpha val="10000"/>
+                    </a:schemeClr>
+                  </a:solidFill>
+                </a:ln>
+                <a:solidFill>
+                  <a:schemeClr val="tx2"/>
+                </a:solidFill>
+                <a:effectLst>
+                  <a:outerShdw blurRad="9525" dist="25400" dir="14640000" algn="tl" rotWithShape="0">
+                    <a:schemeClr val="bg1">
+                      <a:alpha val="30000"/>
+                    </a:schemeClr>
+                  </a:outerShdw>
+                </a:effectLst>
+                <a:latin typeface="+mn-lt"/>
+                <a:ea typeface="+mn-ea"/>
+                <a:cs typeface="+mn-cs"/>
+              </a:defRPr>
+            </a:lvl8pPr>
+            <a:lvl9pPr marL="3106200" indent="-228600" algn="l" defTabSz="457200" rtl="0" eaLnBrk="1" latinLnBrk="0" hangingPunct="1">
+              <a:spcBef>
+                <a:spcPct val="20000"/>
+              </a:spcBef>
+              <a:spcAft>
+                <a:spcPts val="600"/>
+              </a:spcAft>
+              <a:buClr>
+                <a:schemeClr val="tx2"/>
+              </a:buClr>
+              <a:buSzPct val="70000"/>
+              <a:buFont typeface="Wingdings 2" charset="2"/>
+              <a:buChar char=""/>
+              <a:defRPr sz="1400" kern="1200">
+                <a:ln>
+                  <a:solidFill>
+                    <a:schemeClr val="bg1">
+                      <a:lumMod val="75000"/>
+                      <a:lumOff val="25000"/>
+                      <a:alpha val="10000"/>
+                    </a:schemeClr>
+                  </a:solidFill>
+                </a:ln>
+                <a:solidFill>
+                  <a:schemeClr val="tx2"/>
+                </a:solidFill>
+                <a:effectLst>
+                  <a:outerShdw blurRad="9525" dist="25400" dir="14640000" algn="tl" rotWithShape="0">
+                    <a:schemeClr val="bg1">
+                      <a:alpha val="30000"/>
+                    </a:schemeClr>
+                  </a:outerShdw>
+                </a:effectLst>
+                <a:latin typeface="+mn-lt"/>
+                <a:ea typeface="+mn-ea"/>
+                <a:cs typeface="+mn-cs"/>
+              </a:defRPr>
+            </a:lvl9pPr>
+          </a:lstStyle>
+          <a:p>
+            <a:pPr marL="36900" indent="0" algn="ctr">
+              <a:buNone/>
+            </a:pPr>
+            <a:r>
+              <a:rPr lang="en-US" b="1" dirty="0"/>
+              <a:t>Key Finding: At minimum, the model supports a minimum $4 increase to ticket price, yielding an estimated 7 million in added revenue for the year.</a:t>
+            </a:r>
+            <a:r>
+              <a:rPr lang="en-US" dirty="0"/>
+              <a:t> Considering the maximum absolute error of the model, the price could be reasonably increased anywhere from $4 to $25 dollars.</a:t>
+            </a:r>
+          </a:p>
+          <a:p>
+            <a:pPr marL="36900" indent="0" algn="ctr">
+              <a:buFont typeface="Wingdings 2" charset="2"/>
+              <a:buNone/>
+            </a:pPr>
+            <a:endParaRPr lang="en-US" b="1" dirty="0"/>
+          </a:p>
+          <a:p>
+            <a:pPr marL="36900" indent="0" algn="ctr">
+              <a:buFont typeface="Wingdings 2" charset="2"/>
+              <a:buNone/>
+            </a:pPr>
+            <a:endParaRPr lang="en-US" dirty="0"/>
+          </a:p>
+          <a:p>
+            <a:pPr lvl="1"/>
+            <a:endParaRPr lang="en-US" dirty="0"/>
           </a:p>
         </p:txBody>
       </p:sp>
@@ -7567,6 +8087,387 @@
   <p:clrMapOvr>
     <a:masterClrMapping/>
   </p:clrMapOvr>
+  <p:timing>
+    <p:tnLst>
+      <p:par>
+        <p:cTn id="1" dur="indefinite" restart="never" nodeType="tmRoot">
+          <p:childTnLst>
+            <p:seq concurrent="1" nextAc="seek">
+              <p:cTn id="2" dur="indefinite" nodeType="mainSeq">
+                <p:childTnLst>
+                  <p:par>
+                    <p:cTn id="3" fill="hold">
+                      <p:stCondLst>
+                        <p:cond delay="indefinite"/>
+                      </p:stCondLst>
+                      <p:childTnLst>
+                        <p:par>
+                          <p:cTn id="4" fill="hold">
+                            <p:stCondLst>
+                              <p:cond delay="0"/>
+                            </p:stCondLst>
+                            <p:childTnLst>
+                              <p:par>
+                                <p:cTn id="5" presetID="1" presetClass="entr" presetSubtype="0" fill="hold" grpId="0" nodeType="clickEffect">
+                                  <p:stCondLst>
+                                    <p:cond delay="0"/>
+                                  </p:stCondLst>
+                                  <p:childTnLst>
+                                    <p:set>
+                                      <p:cBhvr>
+                                        <p:cTn id="6" dur="1" fill="hold">
+                                          <p:stCondLst>
+                                            <p:cond delay="0"/>
+                                          </p:stCondLst>
+                                        </p:cTn>
+                                        <p:tgtEl>
+                                          <p:spTgt spid="6">
+                                            <p:txEl>
+                                              <p:pRg st="0" end="0"/>
+                                            </p:txEl>
+                                          </p:spTgt>
+                                        </p:tgtEl>
+                                        <p:attrNameLst>
+                                          <p:attrName>style.visibility</p:attrName>
+                                        </p:attrNameLst>
+                                      </p:cBhvr>
+                                      <p:to>
+                                        <p:strVal val="visible"/>
+                                      </p:to>
+                                    </p:set>
+                                  </p:childTnLst>
+                                </p:cTn>
+                              </p:par>
+                            </p:childTnLst>
+                          </p:cTn>
+                        </p:par>
+                      </p:childTnLst>
+                    </p:cTn>
+                  </p:par>
+                  <p:par>
+                    <p:cTn id="7" fill="hold">
+                      <p:stCondLst>
+                        <p:cond delay="indefinite"/>
+                      </p:stCondLst>
+                      <p:childTnLst>
+                        <p:par>
+                          <p:cTn id="8" fill="hold">
+                            <p:stCondLst>
+                              <p:cond delay="0"/>
+                            </p:stCondLst>
+                            <p:childTnLst>
+                              <p:par>
+                                <p:cTn id="9" presetID="1" presetClass="entr" presetSubtype="0" fill="hold" grpId="0" nodeType="clickEffect">
+                                  <p:stCondLst>
+                                    <p:cond delay="0"/>
+                                  </p:stCondLst>
+                                  <p:childTnLst>
+                                    <p:set>
+                                      <p:cBhvr>
+                                        <p:cTn id="10" dur="1" fill="hold">
+                                          <p:stCondLst>
+                                            <p:cond delay="0"/>
+                                          </p:stCondLst>
+                                        </p:cTn>
+                                        <p:tgtEl>
+                                          <p:spTgt spid="3">
+                                            <p:txEl>
+                                              <p:pRg st="2" end="2"/>
+                                            </p:txEl>
+                                          </p:spTgt>
+                                        </p:tgtEl>
+                                        <p:attrNameLst>
+                                          <p:attrName>style.visibility</p:attrName>
+                                        </p:attrNameLst>
+                                      </p:cBhvr>
+                                      <p:to>
+                                        <p:strVal val="visible"/>
+                                      </p:to>
+                                    </p:set>
+                                  </p:childTnLst>
+                                </p:cTn>
+                              </p:par>
+                            </p:childTnLst>
+                          </p:cTn>
+                        </p:par>
+                      </p:childTnLst>
+                    </p:cTn>
+                  </p:par>
+                  <p:par>
+                    <p:cTn id="11" fill="hold">
+                      <p:stCondLst>
+                        <p:cond delay="indefinite"/>
+                      </p:stCondLst>
+                      <p:childTnLst>
+                        <p:par>
+                          <p:cTn id="12" fill="hold">
+                            <p:stCondLst>
+                              <p:cond delay="0"/>
+                            </p:stCondLst>
+                            <p:childTnLst>
+                              <p:par>
+                                <p:cTn id="13" presetID="1" presetClass="entr" presetSubtype="0" fill="hold" grpId="0" nodeType="clickEffect">
+                                  <p:stCondLst>
+                                    <p:cond delay="0"/>
+                                  </p:stCondLst>
+                                  <p:childTnLst>
+                                    <p:set>
+                                      <p:cBhvr>
+                                        <p:cTn id="14" dur="1" fill="hold">
+                                          <p:stCondLst>
+                                            <p:cond delay="0"/>
+                                          </p:stCondLst>
+                                        </p:cTn>
+                                        <p:tgtEl>
+                                          <p:spTgt spid="3">
+                                            <p:txEl>
+                                              <p:pRg st="3" end="3"/>
+                                            </p:txEl>
+                                          </p:spTgt>
+                                        </p:tgtEl>
+                                        <p:attrNameLst>
+                                          <p:attrName>style.visibility</p:attrName>
+                                        </p:attrNameLst>
+                                      </p:cBhvr>
+                                      <p:to>
+                                        <p:strVal val="visible"/>
+                                      </p:to>
+                                    </p:set>
+                                  </p:childTnLst>
+                                </p:cTn>
+                              </p:par>
+                              <p:par>
+                                <p:cTn id="15" presetID="1" presetClass="entr" presetSubtype="0" fill="hold" grpId="0" nodeType="withEffect">
+                                  <p:stCondLst>
+                                    <p:cond delay="0"/>
+                                  </p:stCondLst>
+                                  <p:childTnLst>
+                                    <p:set>
+                                      <p:cBhvr>
+                                        <p:cTn id="16" dur="1" fill="hold">
+                                          <p:stCondLst>
+                                            <p:cond delay="0"/>
+                                          </p:stCondLst>
+                                        </p:cTn>
+                                        <p:tgtEl>
+                                          <p:spTgt spid="3">
+                                            <p:txEl>
+                                              <p:pRg st="4" end="4"/>
+                                            </p:txEl>
+                                          </p:spTgt>
+                                        </p:tgtEl>
+                                        <p:attrNameLst>
+                                          <p:attrName>style.visibility</p:attrName>
+                                        </p:attrNameLst>
+                                      </p:cBhvr>
+                                      <p:to>
+                                        <p:strVal val="visible"/>
+                                      </p:to>
+                                    </p:set>
+                                  </p:childTnLst>
+                                </p:cTn>
+                              </p:par>
+                              <p:par>
+                                <p:cTn id="17" presetID="1" presetClass="entr" presetSubtype="0" fill="hold" grpId="0" nodeType="withEffect">
+                                  <p:stCondLst>
+                                    <p:cond delay="0"/>
+                                  </p:stCondLst>
+                                  <p:childTnLst>
+                                    <p:set>
+                                      <p:cBhvr>
+                                        <p:cTn id="18" dur="1" fill="hold">
+                                          <p:stCondLst>
+                                            <p:cond delay="0"/>
+                                          </p:stCondLst>
+                                        </p:cTn>
+                                        <p:tgtEl>
+                                          <p:spTgt spid="3">
+                                            <p:txEl>
+                                              <p:pRg st="5" end="5"/>
+                                            </p:txEl>
+                                          </p:spTgt>
+                                        </p:tgtEl>
+                                        <p:attrNameLst>
+                                          <p:attrName>style.visibility</p:attrName>
+                                        </p:attrNameLst>
+                                      </p:cBhvr>
+                                      <p:to>
+                                        <p:strVal val="visible"/>
+                                      </p:to>
+                                    </p:set>
+                                  </p:childTnLst>
+                                </p:cTn>
+                              </p:par>
+                            </p:childTnLst>
+                          </p:cTn>
+                        </p:par>
+                      </p:childTnLst>
+                    </p:cTn>
+                  </p:par>
+                  <p:par>
+                    <p:cTn id="19" fill="hold">
+                      <p:stCondLst>
+                        <p:cond delay="indefinite"/>
+                      </p:stCondLst>
+                      <p:childTnLst>
+                        <p:par>
+                          <p:cTn id="20" fill="hold">
+                            <p:stCondLst>
+                              <p:cond delay="0"/>
+                            </p:stCondLst>
+                            <p:childTnLst>
+                              <p:par>
+                                <p:cTn id="21" presetID="1" presetClass="entr" presetSubtype="0" fill="hold" grpId="0" nodeType="clickEffect">
+                                  <p:stCondLst>
+                                    <p:cond delay="0"/>
+                                  </p:stCondLst>
+                                  <p:childTnLst>
+                                    <p:set>
+                                      <p:cBhvr>
+                                        <p:cTn id="22" dur="1" fill="hold">
+                                          <p:stCondLst>
+                                            <p:cond delay="0"/>
+                                          </p:stCondLst>
+                                        </p:cTn>
+                                        <p:tgtEl>
+                                          <p:spTgt spid="3">
+                                            <p:txEl>
+                                              <p:pRg st="6" end="6"/>
+                                            </p:txEl>
+                                          </p:spTgt>
+                                        </p:tgtEl>
+                                        <p:attrNameLst>
+                                          <p:attrName>style.visibility</p:attrName>
+                                        </p:attrNameLst>
+                                      </p:cBhvr>
+                                      <p:to>
+                                        <p:strVal val="visible"/>
+                                      </p:to>
+                                    </p:set>
+                                  </p:childTnLst>
+                                </p:cTn>
+                              </p:par>
+                              <p:par>
+                                <p:cTn id="23" presetID="1" presetClass="entr" presetSubtype="0" fill="hold" grpId="0" nodeType="withEffect">
+                                  <p:stCondLst>
+                                    <p:cond delay="0"/>
+                                  </p:stCondLst>
+                                  <p:childTnLst>
+                                    <p:set>
+                                      <p:cBhvr>
+                                        <p:cTn id="24" dur="1" fill="hold">
+                                          <p:stCondLst>
+                                            <p:cond delay="0"/>
+                                          </p:stCondLst>
+                                        </p:cTn>
+                                        <p:tgtEl>
+                                          <p:spTgt spid="3">
+                                            <p:txEl>
+                                              <p:pRg st="7" end="7"/>
+                                            </p:txEl>
+                                          </p:spTgt>
+                                        </p:tgtEl>
+                                        <p:attrNameLst>
+                                          <p:attrName>style.visibility</p:attrName>
+                                        </p:attrNameLst>
+                                      </p:cBhvr>
+                                      <p:to>
+                                        <p:strVal val="visible"/>
+                                      </p:to>
+                                    </p:set>
+                                  </p:childTnLst>
+                                </p:cTn>
+                              </p:par>
+                              <p:par>
+                                <p:cTn id="25" presetID="1" presetClass="entr" presetSubtype="0" fill="hold" grpId="0" nodeType="withEffect">
+                                  <p:stCondLst>
+                                    <p:cond delay="0"/>
+                                  </p:stCondLst>
+                                  <p:childTnLst>
+                                    <p:set>
+                                      <p:cBhvr>
+                                        <p:cTn id="26" dur="1" fill="hold">
+                                          <p:stCondLst>
+                                            <p:cond delay="0"/>
+                                          </p:stCondLst>
+                                        </p:cTn>
+                                        <p:tgtEl>
+                                          <p:spTgt spid="3">
+                                            <p:txEl>
+                                              <p:pRg st="8" end="8"/>
+                                            </p:txEl>
+                                          </p:spTgt>
+                                        </p:tgtEl>
+                                        <p:attrNameLst>
+                                          <p:attrName>style.visibility</p:attrName>
+                                        </p:attrNameLst>
+                                      </p:cBhvr>
+                                      <p:to>
+                                        <p:strVal val="visible"/>
+                                      </p:to>
+                                    </p:set>
+                                  </p:childTnLst>
+                                </p:cTn>
+                              </p:par>
+                              <p:par>
+                                <p:cTn id="27" presetID="1" presetClass="entr" presetSubtype="0" fill="hold" nodeType="withEffect">
+                                  <p:stCondLst>
+                                    <p:cond delay="0"/>
+                                  </p:stCondLst>
+                                  <p:childTnLst>
+                                    <p:set>
+                                      <p:cBhvr>
+                                        <p:cTn id="28" dur="1" fill="hold">
+                                          <p:stCondLst>
+                                            <p:cond delay="0"/>
+                                          </p:stCondLst>
+                                        </p:cTn>
+                                        <p:tgtEl>
+                                          <p:spTgt spid="5"/>
+                                        </p:tgtEl>
+                                        <p:attrNameLst>
+                                          <p:attrName>style.visibility</p:attrName>
+                                        </p:attrNameLst>
+                                      </p:cBhvr>
+                                      <p:to>
+                                        <p:strVal val="visible"/>
+                                      </p:to>
+                                    </p:set>
+                                  </p:childTnLst>
+                                </p:cTn>
+                              </p:par>
+                            </p:childTnLst>
+                          </p:cTn>
+                        </p:par>
+                      </p:childTnLst>
+                    </p:cTn>
+                  </p:par>
+                </p:childTnLst>
+              </p:cTn>
+              <p:prevCondLst>
+                <p:cond evt="onPrev" delay="0">
+                  <p:tgtEl>
+                    <p:sldTgt/>
+                  </p:tgtEl>
+                </p:cond>
+              </p:prevCondLst>
+              <p:nextCondLst>
+                <p:cond evt="onNext" delay="0">
+                  <p:tgtEl>
+                    <p:sldTgt/>
+                  </p:tgtEl>
+                </p:cond>
+              </p:nextCondLst>
+            </p:seq>
+          </p:childTnLst>
+        </p:cTn>
+      </p:par>
+    </p:tnLst>
+    <p:bldLst>
+      <p:bldP spid="3" grpId="0" uiExpand="1" build="p"/>
+      <p:bldP spid="6" grpId="0" build="p"/>
+    </p:bldLst>
+  </p:timing>
 </p:sld>
 </file>
 
@@ -7592,7 +8493,7 @@
           <p:cNvPr id="2" name="Title 1">
             <a:extLst>
               <a:ext uri="{FF2B5EF4-FFF2-40B4-BE49-F238E27FC236}">
-                <a16:creationId xmlns:a16="http://schemas.microsoft.com/office/drawing/2014/main" id="{53F72E0B-2CE7-44A6-BBB2-E567233B7A1A}"/>
+                <a16:creationId xmlns:a16="http://schemas.microsoft.com/office/drawing/2014/main" id="{32903228-99A3-4CF1-9132-05085193692B}"/>
               </a:ext>
             </a:extLst>
           </p:cNvPr>
@@ -7605,14 +8506,12 @@
         </p:nvSpPr>
         <p:spPr/>
         <p:txBody>
-          <a:bodyPr>
-            <a:normAutofit/>
-          </a:bodyPr>
+          <a:bodyPr/>
           <a:lstStyle/>
           <a:p>
             <a:r>
               <a:rPr lang="en-US" dirty="0"/>
-              <a:t>Modeling Results &amp; Analysis</a:t>
+              <a:t>Key Features in Model</a:t>
             </a:r>
           </a:p>
         </p:txBody>
@@ -7622,7 +8521,7 @@
           <p:cNvPr id="3" name="Content Placeholder 2">
             <a:extLst>
               <a:ext uri="{FF2B5EF4-FFF2-40B4-BE49-F238E27FC236}">
-                <a16:creationId xmlns:a16="http://schemas.microsoft.com/office/drawing/2014/main" id="{132F09DF-8841-4E0D-AAC8-65506A24F305}"/>
+                <a16:creationId xmlns:a16="http://schemas.microsoft.com/office/drawing/2014/main" id="{707D46EC-8FCD-4C5B-8E64-A1F05330DA75}"/>
               </a:ext>
             </a:extLst>
           </p:cNvPr>
@@ -7633,60 +8532,86 @@
             <p:ph sz="half" idx="1"/>
           </p:nvPr>
         </p:nvSpPr>
-        <p:spPr/>
+        <p:spPr>
+          <a:xfrm>
+            <a:off x="913796" y="2076450"/>
+            <a:ext cx="3989158" cy="3622671"/>
+          </a:xfrm>
+        </p:spPr>
         <p:txBody>
           <a:bodyPr/>
           <a:lstStyle/>
           <a:p>
-            <a:pPr algn="l">
-              <a:buFont typeface="Arial" panose="020B0604020202020204" pitchFamily="34" charset="0"/>
-              <a:buChar char="•"/>
+            <a:pPr marL="36900" indent="0">
+              <a:buNone/>
             </a:pPr>
             <a:r>
-              <a:rPr lang="en-US" b="0" i="0" dirty="0">
-                <a:solidFill>
-                  <a:schemeClr val="bg2">
-                    <a:lumMod val="40000"/>
-                    <a:lumOff val="60000"/>
-                  </a:schemeClr>
-                </a:solidFill>
-                <a:effectLst/>
-                <a:latin typeface="Roboto"/>
-              </a:rPr>
-              <a:t>Modeling results and analysis (3-4 slides)</a:t>
-            </a:r>
-          </a:p>
-        </p:txBody>
-      </p:sp>
-      <p:sp>
-        <p:nvSpPr>
-          <p:cNvPr id="4" name="Content Placeholder 3">
+              <a:rPr lang="en-US" dirty="0"/>
+              <a:t>The following features are most critical in predicting ticket price in the ski resort market</a:t>
+            </a:r>
+          </a:p>
+          <a:p>
+            <a:r>
+              <a:rPr lang="en-US" dirty="0"/>
+              <a:t>Fast Quads</a:t>
+            </a:r>
+          </a:p>
+          <a:p>
+            <a:r>
+              <a:rPr lang="en-US" dirty="0"/>
+              <a:t>Runs </a:t>
+            </a:r>
+          </a:p>
+          <a:p>
+            <a:r>
+              <a:rPr lang="en-US" dirty="0"/>
+              <a:t>Snow Making Acreage</a:t>
+            </a:r>
+          </a:p>
+          <a:p>
+            <a:r>
+              <a:rPr lang="en-US" dirty="0"/>
+              <a:t>Vertical Drop</a:t>
+            </a:r>
+          </a:p>
+          <a:p>
+            <a:endParaRPr lang="en-US" dirty="0"/>
+          </a:p>
+        </p:txBody>
+      </p:sp>
+      <p:pic>
+        <p:nvPicPr>
+          <p:cNvPr id="6" name="Content Placeholder 5">
             <a:extLst>
               <a:ext uri="{FF2B5EF4-FFF2-40B4-BE49-F238E27FC236}">
-                <a16:creationId xmlns:a16="http://schemas.microsoft.com/office/drawing/2014/main" id="{971F3C6F-A078-4C79-AC77-68609997C4A7}"/>
+                <a16:creationId xmlns:a16="http://schemas.microsoft.com/office/drawing/2014/main" id="{52616CF9-1284-466A-ABAF-19BAC8A9178E}"/>
               </a:ext>
             </a:extLst>
           </p:cNvPr>
-          <p:cNvSpPr>
-            <a:spLocks noGrp="1"/>
-          </p:cNvSpPr>
+          <p:cNvPicPr>
+            <a:picLocks noGrp="1" noChangeAspect="1"/>
+          </p:cNvPicPr>
           <p:nvPr>
             <p:ph sz="half" idx="2"/>
           </p:nvPr>
-        </p:nvSpPr>
-        <p:spPr/>
-        <p:txBody>
-          <a:bodyPr/>
-          <a:lstStyle/>
-          <a:p>
-            <a:endParaRPr lang="en-US" dirty="0"/>
-          </a:p>
-        </p:txBody>
-      </p:sp>
+        </p:nvPicPr>
+        <p:blipFill>
+          <a:blip r:embed="rId2"/>
+          <a:stretch>
+            <a:fillRect/>
+          </a:stretch>
+        </p:blipFill>
+        <p:spPr>
+          <a:xfrm>
+            <a:off x="5133474" y="1875483"/>
+            <a:ext cx="5903562" cy="4536227"/>
+          </a:xfrm>
+        </p:spPr>
+      </p:pic>
     </p:spTree>
     <p:extLst>
       <p:ext uri="{BB962C8B-B14F-4D97-AF65-F5344CB8AC3E}">
-        <p14:creationId xmlns:p14="http://schemas.microsoft.com/office/powerpoint/2010/main" val="1756300835"/>
+        <p14:creationId xmlns:p14="http://schemas.microsoft.com/office/powerpoint/2010/main" val="180957476"/>
       </p:ext>
     </p:extLst>
   </p:cSld>
@@ -7718,6 +8643,791 @@
           <p:cNvPr id="2" name="Title 1">
             <a:extLst>
               <a:ext uri="{FF2B5EF4-FFF2-40B4-BE49-F238E27FC236}">
+                <a16:creationId xmlns:a16="http://schemas.microsoft.com/office/drawing/2014/main" id="{0B7FA164-06F4-470F-B438-527E177DB653}"/>
+              </a:ext>
+            </a:extLst>
+          </p:cNvPr>
+          <p:cNvSpPr>
+            <a:spLocks noGrp="1"/>
+          </p:cNvSpPr>
+          <p:nvPr>
+            <p:ph type="title"/>
+          </p:nvPr>
+        </p:nvSpPr>
+        <p:spPr/>
+        <p:txBody>
+          <a:bodyPr/>
+          <a:lstStyle/>
+          <a:p>
+            <a:r>
+              <a:rPr lang="en-US" dirty="0"/>
+              <a:t>Key Feature: Snow Making Acreage</a:t>
+            </a:r>
+          </a:p>
+        </p:txBody>
+      </p:sp>
+      <p:sp>
+        <p:nvSpPr>
+          <p:cNvPr id="3" name="Content Placeholder 2">
+            <a:extLst>
+              <a:ext uri="{FF2B5EF4-FFF2-40B4-BE49-F238E27FC236}">
+                <a16:creationId xmlns:a16="http://schemas.microsoft.com/office/drawing/2014/main" id="{86B13BD2-DAB2-4413-9C09-747F65738177}"/>
+              </a:ext>
+            </a:extLst>
+          </p:cNvPr>
+          <p:cNvSpPr>
+            <a:spLocks noGrp="1"/>
+          </p:cNvSpPr>
+          <p:nvPr>
+            <p:ph sz="half" idx="1"/>
+          </p:nvPr>
+        </p:nvSpPr>
+        <p:spPr/>
+        <p:txBody>
+          <a:bodyPr/>
+          <a:lstStyle/>
+          <a:p>
+            <a:r>
+              <a:rPr lang="en-US" dirty="0"/>
+              <a:t>Big Mountain is a market leader in snow making acreage </a:t>
+            </a:r>
+          </a:p>
+          <a:p>
+            <a:r>
+              <a:rPr lang="en-US" dirty="0"/>
+              <a:t>Our ticket price position in the market is disproportionate to this feature</a:t>
+            </a:r>
+          </a:p>
+          <a:p>
+            <a:r>
+              <a:rPr lang="en-US" dirty="0"/>
+              <a:t>This is feature is key in supporting the increase in ticket price</a:t>
+            </a:r>
+          </a:p>
+        </p:txBody>
+      </p:sp>
+      <p:pic>
+        <p:nvPicPr>
+          <p:cNvPr id="5" name="Content Placeholder 15">
+            <a:extLst>
+              <a:ext uri="{FF2B5EF4-FFF2-40B4-BE49-F238E27FC236}">
+                <a16:creationId xmlns:a16="http://schemas.microsoft.com/office/drawing/2014/main" id="{449D62E9-D2F3-459C-9F34-ACA4092866C5}"/>
+              </a:ext>
+            </a:extLst>
+          </p:cNvPr>
+          <p:cNvPicPr>
+            <a:picLocks noChangeAspect="1"/>
+          </p:cNvPicPr>
+          <p:nvPr/>
+        </p:nvPicPr>
+        <p:blipFill>
+          <a:blip r:embed="rId2"/>
+          <a:stretch>
+            <a:fillRect/>
+          </a:stretch>
+        </p:blipFill>
+        <p:spPr>
+          <a:xfrm>
+            <a:off x="6457092" y="1680422"/>
+            <a:ext cx="4764087" cy="2431908"/>
+          </a:xfrm>
+          <a:prstGeom prst="rect">
+            <a:avLst/>
+          </a:prstGeom>
+          <a:effectLst>
+            <a:outerShdw blurRad="25400" dir="17880000">
+              <a:srgbClr val="000000">
+                <a:alpha val="46000"/>
+              </a:srgbClr>
+            </a:outerShdw>
+          </a:effectLst>
+        </p:spPr>
+      </p:pic>
+      <p:pic>
+        <p:nvPicPr>
+          <p:cNvPr id="8" name="Picture 7">
+            <a:extLst>
+              <a:ext uri="{FF2B5EF4-FFF2-40B4-BE49-F238E27FC236}">
+                <a16:creationId xmlns:a16="http://schemas.microsoft.com/office/drawing/2014/main" id="{7791DA73-8EF1-442C-80F2-149305457489}"/>
+              </a:ext>
+            </a:extLst>
+          </p:cNvPr>
+          <p:cNvPicPr>
+            <a:picLocks noChangeAspect="1"/>
+          </p:cNvPicPr>
+          <p:nvPr/>
+        </p:nvPicPr>
+        <p:blipFill>
+          <a:blip r:embed="rId3"/>
+          <a:stretch>
+            <a:fillRect/>
+          </a:stretch>
+        </p:blipFill>
+        <p:spPr>
+          <a:xfrm>
+            <a:off x="6457092" y="4186858"/>
+            <a:ext cx="4764087" cy="2401039"/>
+          </a:xfrm>
+          <a:prstGeom prst="rect">
+            <a:avLst/>
+          </a:prstGeom>
+        </p:spPr>
+      </p:pic>
+      <p:sp>
+        <p:nvSpPr>
+          <p:cNvPr id="9" name="TextBox 8">
+            <a:extLst>
+              <a:ext uri="{FF2B5EF4-FFF2-40B4-BE49-F238E27FC236}">
+                <a16:creationId xmlns:a16="http://schemas.microsoft.com/office/drawing/2014/main" id="{8C1AA0CE-F424-43C2-823A-310900CF49B1}"/>
+              </a:ext>
+            </a:extLst>
+          </p:cNvPr>
+          <p:cNvSpPr txBox="1"/>
+          <p:nvPr/>
+        </p:nvSpPr>
+        <p:spPr>
+          <a:xfrm>
+            <a:off x="9107424" y="2076451"/>
+            <a:ext cx="1645920" cy="923330"/>
+          </a:xfrm>
+          <a:prstGeom prst="rect">
+            <a:avLst/>
+          </a:prstGeom>
+          <a:noFill/>
+        </p:spPr>
+        <p:txBody>
+          <a:bodyPr wrap="square" rtlCol="0">
+            <a:spAutoFit/>
+          </a:bodyPr>
+          <a:lstStyle/>
+          <a:p>
+            <a:pPr algn="ctr"/>
+            <a:r>
+              <a:rPr lang="en-US" b="1" dirty="0">
+                <a:solidFill>
+                  <a:schemeClr val="bg1"/>
+                </a:solidFill>
+              </a:rPr>
+              <a:t>Resort Ticket Price Across Market</a:t>
+            </a:r>
+          </a:p>
+        </p:txBody>
+      </p:sp>
+      <p:sp>
+        <p:nvSpPr>
+          <p:cNvPr id="10" name="TextBox 9">
+            <a:extLst>
+              <a:ext uri="{FF2B5EF4-FFF2-40B4-BE49-F238E27FC236}">
+                <a16:creationId xmlns:a16="http://schemas.microsoft.com/office/drawing/2014/main" id="{5708C673-F263-4A1A-8538-BECE0DFB148A}"/>
+              </a:ext>
+            </a:extLst>
+          </p:cNvPr>
+          <p:cNvSpPr txBox="1"/>
+          <p:nvPr/>
+        </p:nvSpPr>
+        <p:spPr>
+          <a:xfrm>
+            <a:off x="8510016" y="4516925"/>
+            <a:ext cx="1645920" cy="923330"/>
+          </a:xfrm>
+          <a:prstGeom prst="rect">
+            <a:avLst/>
+          </a:prstGeom>
+          <a:noFill/>
+        </p:spPr>
+        <p:txBody>
+          <a:bodyPr wrap="square" rtlCol="0">
+            <a:spAutoFit/>
+          </a:bodyPr>
+          <a:lstStyle/>
+          <a:p>
+            <a:pPr algn="ctr"/>
+            <a:r>
+              <a:rPr lang="en-US" b="1" dirty="0">
+                <a:solidFill>
+                  <a:schemeClr val="bg1"/>
+                </a:solidFill>
+              </a:rPr>
+              <a:t>Snow Making Acreage Across Market</a:t>
+            </a:r>
+          </a:p>
+        </p:txBody>
+      </p:sp>
+    </p:spTree>
+    <p:extLst>
+      <p:ext uri="{BB962C8B-B14F-4D97-AF65-F5344CB8AC3E}">
+        <p14:creationId xmlns:p14="http://schemas.microsoft.com/office/powerpoint/2010/main" val="159289053"/>
+      </p:ext>
+    </p:extLst>
+  </p:cSld>
+  <p:clrMapOvr>
+    <a:masterClrMapping/>
+  </p:clrMapOvr>
+</p:sld>
+</file>
+
+<file path=ppt/slides/slide6.xml><?xml version="1.0" encoding="utf-8"?>
+<p:sld xmlns:a="http://schemas.openxmlformats.org/drawingml/2006/main" xmlns:r="http://schemas.openxmlformats.org/officeDocument/2006/relationships" xmlns:p="http://schemas.openxmlformats.org/presentationml/2006/main">
+  <p:cSld>
+    <p:spTree>
+      <p:nvGrpSpPr>
+        <p:cNvPr id="1" name=""/>
+        <p:cNvGrpSpPr/>
+        <p:nvPr/>
+      </p:nvGrpSpPr>
+      <p:grpSpPr>
+        <a:xfrm>
+          <a:off x="0" y="0"/>
+          <a:ext cx="0" cy="0"/>
+          <a:chOff x="0" y="0"/>
+          <a:chExt cx="0" cy="0"/>
+        </a:xfrm>
+      </p:grpSpPr>
+      <p:sp>
+        <p:nvSpPr>
+          <p:cNvPr id="2" name="Title 1">
+            <a:extLst>
+              <a:ext uri="{FF2B5EF4-FFF2-40B4-BE49-F238E27FC236}">
+                <a16:creationId xmlns:a16="http://schemas.microsoft.com/office/drawing/2014/main" id="{0B7FA164-06F4-470F-B438-527E177DB653}"/>
+              </a:ext>
+            </a:extLst>
+          </p:cNvPr>
+          <p:cNvSpPr>
+            <a:spLocks noGrp="1"/>
+          </p:cNvSpPr>
+          <p:nvPr>
+            <p:ph type="title"/>
+          </p:nvPr>
+        </p:nvSpPr>
+        <p:spPr/>
+        <p:txBody>
+          <a:bodyPr>
+            <a:normAutofit/>
+          </a:bodyPr>
+          <a:lstStyle/>
+          <a:p>
+            <a:r>
+              <a:rPr lang="en-US" dirty="0"/>
+              <a:t>Key Feature: Number of Runs </a:t>
+            </a:r>
+          </a:p>
+        </p:txBody>
+      </p:sp>
+      <p:sp>
+        <p:nvSpPr>
+          <p:cNvPr id="3" name="Content Placeholder 2">
+            <a:extLst>
+              <a:ext uri="{FF2B5EF4-FFF2-40B4-BE49-F238E27FC236}">
+                <a16:creationId xmlns:a16="http://schemas.microsoft.com/office/drawing/2014/main" id="{86B13BD2-DAB2-4413-9C09-747F65738177}"/>
+              </a:ext>
+            </a:extLst>
+          </p:cNvPr>
+          <p:cNvSpPr>
+            <a:spLocks noGrp="1"/>
+          </p:cNvSpPr>
+          <p:nvPr>
+            <p:ph sz="half" idx="1"/>
+          </p:nvPr>
+        </p:nvSpPr>
+        <p:spPr/>
+        <p:txBody>
+          <a:bodyPr>
+            <a:normAutofit fontScale="92500" lnSpcReduction="10000"/>
+          </a:bodyPr>
+          <a:lstStyle/>
+          <a:p>
+            <a:r>
+              <a:rPr lang="en-US" dirty="0"/>
+              <a:t>Few resorts boast more runs than Big Mountain</a:t>
+            </a:r>
+          </a:p>
+          <a:p>
+            <a:r>
+              <a:rPr lang="en-US" dirty="0"/>
+              <a:t>Though not as drastic, there is a discrepancy between our ticket price and number of runs position in the market</a:t>
+            </a:r>
+          </a:p>
+          <a:p>
+            <a:r>
+              <a:rPr lang="en-US" dirty="0"/>
+              <a:t>This further drives the projected price increase</a:t>
+            </a:r>
+          </a:p>
+          <a:p>
+            <a:r>
+              <a:rPr lang="en-US" i="1" dirty="0"/>
+              <a:t>Note: An outlier has been removed from this distribution; Aspen Snowmass has 336 runs </a:t>
+            </a:r>
+          </a:p>
+        </p:txBody>
+      </p:sp>
+      <p:pic>
+        <p:nvPicPr>
+          <p:cNvPr id="7" name="Content Placeholder 12">
+            <a:extLst>
+              <a:ext uri="{FF2B5EF4-FFF2-40B4-BE49-F238E27FC236}">
+                <a16:creationId xmlns:a16="http://schemas.microsoft.com/office/drawing/2014/main" id="{FE7F8A51-9B23-4BA8-AF50-67B762FC2BC3}"/>
+              </a:ext>
+            </a:extLst>
+          </p:cNvPr>
+          <p:cNvPicPr>
+            <a:picLocks noChangeAspect="1"/>
+          </p:cNvPicPr>
+          <p:nvPr/>
+        </p:nvPicPr>
+        <p:blipFill>
+          <a:blip r:embed="rId2"/>
+          <a:stretch>
+            <a:fillRect/>
+          </a:stretch>
+        </p:blipFill>
+        <p:spPr>
+          <a:xfrm>
+            <a:off x="6457092" y="4225104"/>
+            <a:ext cx="4779963" cy="2443948"/>
+          </a:xfrm>
+          <a:prstGeom prst="rect">
+            <a:avLst/>
+          </a:prstGeom>
+        </p:spPr>
+      </p:pic>
+      <p:pic>
+        <p:nvPicPr>
+          <p:cNvPr id="8" name="Content Placeholder 15">
+            <a:extLst>
+              <a:ext uri="{FF2B5EF4-FFF2-40B4-BE49-F238E27FC236}">
+                <a16:creationId xmlns:a16="http://schemas.microsoft.com/office/drawing/2014/main" id="{0801A880-12DB-41EE-B26B-3CCD120F9884}"/>
+              </a:ext>
+            </a:extLst>
+          </p:cNvPr>
+          <p:cNvPicPr>
+            <a:picLocks noChangeAspect="1"/>
+          </p:cNvPicPr>
+          <p:nvPr/>
+        </p:nvPicPr>
+        <p:blipFill>
+          <a:blip r:embed="rId3"/>
+          <a:stretch>
+            <a:fillRect/>
+          </a:stretch>
+        </p:blipFill>
+        <p:spPr>
+          <a:xfrm>
+            <a:off x="6457092" y="1690707"/>
+            <a:ext cx="4764087" cy="2431908"/>
+          </a:xfrm>
+          <a:prstGeom prst="rect">
+            <a:avLst/>
+          </a:prstGeom>
+          <a:effectLst>
+            <a:outerShdw blurRad="25400" dir="17880000">
+              <a:srgbClr val="000000">
+                <a:alpha val="46000"/>
+              </a:srgbClr>
+            </a:outerShdw>
+          </a:effectLst>
+        </p:spPr>
+      </p:pic>
+      <p:sp>
+        <p:nvSpPr>
+          <p:cNvPr id="10" name="TextBox 9">
+            <a:extLst>
+              <a:ext uri="{FF2B5EF4-FFF2-40B4-BE49-F238E27FC236}">
+                <a16:creationId xmlns:a16="http://schemas.microsoft.com/office/drawing/2014/main" id="{12FB58DE-5B24-4712-AEB3-32C1B02C5AB3}"/>
+              </a:ext>
+            </a:extLst>
+          </p:cNvPr>
+          <p:cNvSpPr txBox="1"/>
+          <p:nvPr/>
+        </p:nvSpPr>
+        <p:spPr>
+          <a:xfrm>
+            <a:off x="7723632" y="4327594"/>
+            <a:ext cx="1645920" cy="646331"/>
+          </a:xfrm>
+          <a:prstGeom prst="rect">
+            <a:avLst/>
+          </a:prstGeom>
+          <a:noFill/>
+        </p:spPr>
+        <p:txBody>
+          <a:bodyPr wrap="square" rtlCol="0">
+            <a:spAutoFit/>
+          </a:bodyPr>
+          <a:lstStyle/>
+          <a:p>
+            <a:pPr algn="ctr"/>
+            <a:r>
+              <a:rPr lang="en-US" b="1" dirty="0">
+                <a:solidFill>
+                  <a:schemeClr val="bg1"/>
+                </a:solidFill>
+              </a:rPr>
+              <a:t># of  Runs Across Market</a:t>
+            </a:r>
+          </a:p>
+        </p:txBody>
+      </p:sp>
+      <p:sp>
+        <p:nvSpPr>
+          <p:cNvPr id="11" name="TextBox 10">
+            <a:extLst>
+              <a:ext uri="{FF2B5EF4-FFF2-40B4-BE49-F238E27FC236}">
+                <a16:creationId xmlns:a16="http://schemas.microsoft.com/office/drawing/2014/main" id="{0227A1DD-6125-40ED-82E0-0419F4542AE7}"/>
+              </a:ext>
+            </a:extLst>
+          </p:cNvPr>
+          <p:cNvSpPr txBox="1"/>
+          <p:nvPr/>
+        </p:nvSpPr>
+        <p:spPr>
+          <a:xfrm>
+            <a:off x="9107424" y="2076451"/>
+            <a:ext cx="1645920" cy="923330"/>
+          </a:xfrm>
+          <a:prstGeom prst="rect">
+            <a:avLst/>
+          </a:prstGeom>
+          <a:noFill/>
+        </p:spPr>
+        <p:txBody>
+          <a:bodyPr wrap="square" rtlCol="0">
+            <a:spAutoFit/>
+          </a:bodyPr>
+          <a:lstStyle/>
+          <a:p>
+            <a:pPr algn="ctr"/>
+            <a:r>
+              <a:rPr lang="en-US" b="1" dirty="0">
+                <a:solidFill>
+                  <a:schemeClr val="bg1"/>
+                </a:solidFill>
+              </a:rPr>
+              <a:t>Resort Ticket Price Across Market</a:t>
+            </a:r>
+          </a:p>
+        </p:txBody>
+      </p:sp>
+    </p:spTree>
+    <p:extLst>
+      <p:ext uri="{BB962C8B-B14F-4D97-AF65-F5344CB8AC3E}">
+        <p14:creationId xmlns:p14="http://schemas.microsoft.com/office/powerpoint/2010/main" val="1551162196"/>
+      </p:ext>
+    </p:extLst>
+  </p:cSld>
+  <p:clrMapOvr>
+    <a:masterClrMapping/>
+  </p:clrMapOvr>
+</p:sld>
+</file>
+
+<file path=ppt/slides/slide7.xml><?xml version="1.0" encoding="utf-8"?>
+<p:sld xmlns:a="http://schemas.openxmlformats.org/drawingml/2006/main" xmlns:r="http://schemas.openxmlformats.org/officeDocument/2006/relationships" xmlns:p="http://schemas.openxmlformats.org/presentationml/2006/main">
+  <p:cSld>
+    <p:spTree>
+      <p:nvGrpSpPr>
+        <p:cNvPr id="1" name=""/>
+        <p:cNvGrpSpPr/>
+        <p:nvPr/>
+      </p:nvGrpSpPr>
+      <p:grpSpPr>
+        <a:xfrm>
+          <a:off x="0" y="0"/>
+          <a:ext cx="0" cy="0"/>
+          <a:chOff x="0" y="0"/>
+          <a:chExt cx="0" cy="0"/>
+        </a:xfrm>
+      </p:grpSpPr>
+      <p:sp>
+        <p:nvSpPr>
+          <p:cNvPr id="2" name="Title 1">
+            <a:extLst>
+              <a:ext uri="{FF2B5EF4-FFF2-40B4-BE49-F238E27FC236}">
+                <a16:creationId xmlns:a16="http://schemas.microsoft.com/office/drawing/2014/main" id="{0B7FA164-06F4-470F-B438-527E177DB653}"/>
+              </a:ext>
+            </a:extLst>
+          </p:cNvPr>
+          <p:cNvSpPr>
+            <a:spLocks noGrp="1"/>
+          </p:cNvSpPr>
+          <p:nvPr>
+            <p:ph type="title"/>
+          </p:nvPr>
+        </p:nvSpPr>
+        <p:spPr/>
+        <p:txBody>
+          <a:bodyPr/>
+          <a:lstStyle/>
+          <a:p>
+            <a:r>
+              <a:rPr lang="en-US" dirty="0"/>
+              <a:t>Key Feature: Fast Quads</a:t>
+            </a:r>
+          </a:p>
+        </p:txBody>
+      </p:sp>
+      <p:sp>
+        <p:nvSpPr>
+          <p:cNvPr id="3" name="Content Placeholder 2">
+            <a:extLst>
+              <a:ext uri="{FF2B5EF4-FFF2-40B4-BE49-F238E27FC236}">
+                <a16:creationId xmlns:a16="http://schemas.microsoft.com/office/drawing/2014/main" id="{86B13BD2-DAB2-4413-9C09-747F65738177}"/>
+              </a:ext>
+            </a:extLst>
+          </p:cNvPr>
+          <p:cNvSpPr>
+            <a:spLocks noGrp="1"/>
+          </p:cNvSpPr>
+          <p:nvPr>
+            <p:ph sz="half" idx="1"/>
+          </p:nvPr>
+        </p:nvSpPr>
+        <p:spPr/>
+        <p:txBody>
+          <a:bodyPr/>
+          <a:lstStyle/>
+          <a:p>
+            <a:r>
+              <a:rPr lang="en-US" dirty="0"/>
+              <a:t>Big Mountain is one of the few resorts to offer Fast Quads, let alone 3 of them</a:t>
+            </a:r>
+          </a:p>
+          <a:p>
+            <a:r>
+              <a:rPr lang="en-US" dirty="0"/>
+              <a:t>Some resorts offer far more, but there are fewer of them</a:t>
+            </a:r>
+          </a:p>
+          <a:p>
+            <a:r>
+              <a:rPr lang="en-US" dirty="0"/>
+              <a:t>Currently, this feature places Big Mountain in the upper tier of resorts</a:t>
+            </a:r>
+          </a:p>
+        </p:txBody>
+      </p:sp>
+      <p:pic>
+        <p:nvPicPr>
+          <p:cNvPr id="5" name="Content Placeholder 15">
+            <a:extLst>
+              <a:ext uri="{FF2B5EF4-FFF2-40B4-BE49-F238E27FC236}">
+                <a16:creationId xmlns:a16="http://schemas.microsoft.com/office/drawing/2014/main" id="{449D62E9-D2F3-459C-9F34-ACA4092866C5}"/>
+              </a:ext>
+            </a:extLst>
+          </p:cNvPr>
+          <p:cNvPicPr>
+            <a:picLocks noChangeAspect="1"/>
+          </p:cNvPicPr>
+          <p:nvPr/>
+        </p:nvPicPr>
+        <p:blipFill>
+          <a:blip r:embed="rId2"/>
+          <a:stretch>
+            <a:fillRect/>
+          </a:stretch>
+        </p:blipFill>
+        <p:spPr>
+          <a:xfrm>
+            <a:off x="6457092" y="1680422"/>
+            <a:ext cx="4764087" cy="2431908"/>
+          </a:xfrm>
+          <a:prstGeom prst="rect">
+            <a:avLst/>
+          </a:prstGeom>
+          <a:effectLst>
+            <a:outerShdw blurRad="25400" dir="17880000">
+              <a:srgbClr val="000000">
+                <a:alpha val="46000"/>
+              </a:srgbClr>
+            </a:outerShdw>
+          </a:effectLst>
+        </p:spPr>
+      </p:pic>
+      <p:sp>
+        <p:nvSpPr>
+          <p:cNvPr id="9" name="TextBox 8">
+            <a:extLst>
+              <a:ext uri="{FF2B5EF4-FFF2-40B4-BE49-F238E27FC236}">
+                <a16:creationId xmlns:a16="http://schemas.microsoft.com/office/drawing/2014/main" id="{8C1AA0CE-F424-43C2-823A-310900CF49B1}"/>
+              </a:ext>
+            </a:extLst>
+          </p:cNvPr>
+          <p:cNvSpPr txBox="1"/>
+          <p:nvPr/>
+        </p:nvSpPr>
+        <p:spPr>
+          <a:xfrm>
+            <a:off x="9107424" y="2076451"/>
+            <a:ext cx="1645920" cy="923330"/>
+          </a:xfrm>
+          <a:prstGeom prst="rect">
+            <a:avLst/>
+          </a:prstGeom>
+          <a:noFill/>
+        </p:spPr>
+        <p:txBody>
+          <a:bodyPr wrap="square" rtlCol="0">
+            <a:spAutoFit/>
+          </a:bodyPr>
+          <a:lstStyle/>
+          <a:p>
+            <a:pPr algn="ctr"/>
+            <a:r>
+              <a:rPr lang="en-US" b="1" dirty="0">
+                <a:solidFill>
+                  <a:schemeClr val="bg1"/>
+                </a:solidFill>
+              </a:rPr>
+              <a:t>Resort Ticket Price Across Market</a:t>
+            </a:r>
+          </a:p>
+        </p:txBody>
+      </p:sp>
+      <p:sp>
+        <p:nvSpPr>
+          <p:cNvPr id="10" name="TextBox 9">
+            <a:extLst>
+              <a:ext uri="{FF2B5EF4-FFF2-40B4-BE49-F238E27FC236}">
+                <a16:creationId xmlns:a16="http://schemas.microsoft.com/office/drawing/2014/main" id="{5708C673-F263-4A1A-8538-BECE0DFB148A}"/>
+              </a:ext>
+            </a:extLst>
+          </p:cNvPr>
+          <p:cNvSpPr txBox="1"/>
+          <p:nvPr/>
+        </p:nvSpPr>
+        <p:spPr>
+          <a:xfrm>
+            <a:off x="8510016" y="4516925"/>
+            <a:ext cx="1645920" cy="923330"/>
+          </a:xfrm>
+          <a:prstGeom prst="rect">
+            <a:avLst/>
+          </a:prstGeom>
+          <a:noFill/>
+        </p:spPr>
+        <p:txBody>
+          <a:bodyPr wrap="square" rtlCol="0">
+            <a:spAutoFit/>
+          </a:bodyPr>
+          <a:lstStyle/>
+          <a:p>
+            <a:pPr algn="ctr"/>
+            <a:r>
+              <a:rPr lang="en-US" b="1" dirty="0">
+                <a:solidFill>
+                  <a:schemeClr val="bg1"/>
+                </a:solidFill>
+              </a:rPr>
+              <a:t>Snow Making Acreage Across Market</a:t>
+            </a:r>
+          </a:p>
+        </p:txBody>
+      </p:sp>
+      <p:pic>
+        <p:nvPicPr>
+          <p:cNvPr id="11" name="Picture 10">
+            <a:extLst>
+              <a:ext uri="{FF2B5EF4-FFF2-40B4-BE49-F238E27FC236}">
+                <a16:creationId xmlns:a16="http://schemas.microsoft.com/office/drawing/2014/main" id="{475B1934-DD5F-488B-817F-61244EB60AC6}"/>
+              </a:ext>
+            </a:extLst>
+          </p:cNvPr>
+          <p:cNvPicPr>
+            <a:picLocks noChangeAspect="1"/>
+          </p:cNvPicPr>
+          <p:nvPr/>
+        </p:nvPicPr>
+        <p:blipFill>
+          <a:blip r:embed="rId3"/>
+          <a:stretch>
+            <a:fillRect/>
+          </a:stretch>
+        </p:blipFill>
+        <p:spPr>
+          <a:xfrm>
+            <a:off x="6489207" y="4224301"/>
+            <a:ext cx="4778350" cy="2431908"/>
+          </a:xfrm>
+          <a:prstGeom prst="rect">
+            <a:avLst/>
+          </a:prstGeom>
+        </p:spPr>
+      </p:pic>
+      <p:sp>
+        <p:nvSpPr>
+          <p:cNvPr id="12" name="TextBox 11">
+            <a:extLst>
+              <a:ext uri="{FF2B5EF4-FFF2-40B4-BE49-F238E27FC236}">
+                <a16:creationId xmlns:a16="http://schemas.microsoft.com/office/drawing/2014/main" id="{672EA5A9-6879-4FE7-AE1B-798A721B4F1B}"/>
+              </a:ext>
+            </a:extLst>
+          </p:cNvPr>
+          <p:cNvSpPr txBox="1"/>
+          <p:nvPr/>
+        </p:nvSpPr>
+        <p:spPr>
+          <a:xfrm>
+            <a:off x="8976360" y="4602021"/>
+            <a:ext cx="1645920" cy="923330"/>
+          </a:xfrm>
+          <a:prstGeom prst="rect">
+            <a:avLst/>
+          </a:prstGeom>
+          <a:noFill/>
+        </p:spPr>
+        <p:txBody>
+          <a:bodyPr wrap="square" rtlCol="0">
+            <a:spAutoFit/>
+          </a:bodyPr>
+          <a:lstStyle/>
+          <a:p>
+            <a:pPr algn="ctr"/>
+            <a:r>
+              <a:rPr lang="en-US" b="1" dirty="0">
+                <a:solidFill>
+                  <a:schemeClr val="bg1"/>
+                </a:solidFill>
+              </a:rPr>
+              <a:t>Fast Quads Availability Across Market</a:t>
+            </a:r>
+          </a:p>
+        </p:txBody>
+      </p:sp>
+    </p:spTree>
+    <p:extLst>
+      <p:ext uri="{BB962C8B-B14F-4D97-AF65-F5344CB8AC3E}">
+        <p14:creationId xmlns:p14="http://schemas.microsoft.com/office/powerpoint/2010/main" val="2910556904"/>
+      </p:ext>
+    </p:extLst>
+  </p:cSld>
+  <p:clrMapOvr>
+    <a:masterClrMapping/>
+  </p:clrMapOvr>
+</p:sld>
+</file>
+
+<file path=ppt/slides/slide8.xml><?xml version="1.0" encoding="utf-8"?>
+<p:sld xmlns:a="http://schemas.openxmlformats.org/drawingml/2006/main" xmlns:r="http://schemas.openxmlformats.org/officeDocument/2006/relationships" xmlns:p="http://schemas.openxmlformats.org/presentationml/2006/main">
+  <p:cSld>
+    <p:spTree>
+      <p:nvGrpSpPr>
+        <p:cNvPr id="1" name=""/>
+        <p:cNvGrpSpPr/>
+        <p:nvPr/>
+      </p:nvGrpSpPr>
+      <p:grpSpPr>
+        <a:xfrm>
+          <a:off x="0" y="0"/>
+          <a:ext cx="0" cy="0"/>
+          <a:chOff x="0" y="0"/>
+          <a:chExt cx="0" cy="0"/>
+        </a:xfrm>
+      </p:grpSpPr>
+      <p:sp>
+        <p:nvSpPr>
+          <p:cNvPr id="2" name="Title 1">
+            <a:extLst>
+              <a:ext uri="{FF2B5EF4-FFF2-40B4-BE49-F238E27FC236}">
                 <a16:creationId xmlns:a16="http://schemas.microsoft.com/office/drawing/2014/main" id="{6E6637A3-2980-49FA-BB53-AED8BA6AAA24}"/>
               </a:ext>
             </a:extLst>
@@ -7757,12 +9467,78 @@
             <p:ph idx="1"/>
           </p:nvPr>
         </p:nvSpPr>
-        <p:spPr/>
-        <p:txBody>
-          <a:bodyPr/>
+        <p:spPr>
+          <a:xfrm>
+            <a:off x="913795" y="1866900"/>
+            <a:ext cx="10353762" cy="4381500"/>
+          </a:xfrm>
+        </p:spPr>
+        <p:txBody>
+          <a:bodyPr>
+            <a:normAutofit fontScale="92500" lnSpcReduction="10000"/>
+          </a:bodyPr>
           <a:lstStyle/>
           <a:p>
-            <a:endParaRPr lang="en-US"/>
+            <a:r>
+              <a:rPr lang="en-US" dirty="0"/>
+              <a:t>The model finds a discrepancy between what Big Mountain currently charges, and what the market currently values its facilities at.</a:t>
+            </a:r>
+          </a:p>
+          <a:p>
+            <a:pPr lvl="1"/>
+            <a:r>
+              <a:rPr lang="en-US" dirty="0"/>
+              <a:t>Key features include snow making acreage and number of runs, in which Big Mountain is a market leader.</a:t>
+            </a:r>
+          </a:p>
+          <a:p>
+            <a:r>
+              <a:rPr lang="en-US" dirty="0"/>
+              <a:t>This discrepancy is $4 at absolute minimum, yielding a potential increase in revenue by 7 million next year.</a:t>
+            </a:r>
+          </a:p>
+          <a:p>
+            <a:pPr lvl="1"/>
+            <a:r>
+              <a:rPr lang="en-US" dirty="0"/>
+              <a:t>Taking the maximum absolute error of the model, the price could be reasonably increased anywhere from $4 to $25 dollars.</a:t>
+            </a:r>
+          </a:p>
+          <a:p>
+            <a:r>
+              <a:rPr lang="en-US" dirty="0"/>
+              <a:t>The model has further identified two profitable changes:</a:t>
+            </a:r>
+          </a:p>
+          <a:p>
+            <a:pPr lvl="1"/>
+            <a:r>
+              <a:rPr lang="en-US" dirty="0"/>
+              <a:t>Increase vertical drop, add chair lift (after considering cost vs. 3.5 million projected revenue)</a:t>
+            </a:r>
+          </a:p>
+          <a:p>
+            <a:pPr lvl="1"/>
+            <a:r>
+              <a:rPr lang="en-US" dirty="0"/>
+              <a:t>Remove at least 1 run</a:t>
+            </a:r>
+          </a:p>
+          <a:p>
+            <a:pPr lvl="1"/>
+            <a:endParaRPr lang="en-US" dirty="0"/>
+          </a:p>
+          <a:p>
+            <a:pPr marL="450000" lvl="1" indent="0">
+              <a:buNone/>
+            </a:pPr>
+            <a:endParaRPr lang="en-US" dirty="0"/>
+          </a:p>
+          <a:p>
+            <a:endParaRPr lang="en-US" dirty="0"/>
+          </a:p>
+          <a:p>
+            <a:endParaRPr lang="en-US" dirty="0"/>
           </a:p>
         </p:txBody>
       </p:sp>
@@ -7776,6 +9552,307 @@
   <p:clrMapOvr>
     <a:masterClrMapping/>
   </p:clrMapOvr>
+  <p:timing>
+    <p:tnLst>
+      <p:par>
+        <p:cTn id="1" dur="indefinite" restart="never" nodeType="tmRoot">
+          <p:childTnLst>
+            <p:seq concurrent="1" nextAc="seek">
+              <p:cTn id="2" dur="indefinite" nodeType="mainSeq">
+                <p:childTnLst>
+                  <p:par>
+                    <p:cTn id="3" fill="hold">
+                      <p:stCondLst>
+                        <p:cond delay="indefinite"/>
+                      </p:stCondLst>
+                      <p:childTnLst>
+                        <p:par>
+                          <p:cTn id="4" fill="hold">
+                            <p:stCondLst>
+                              <p:cond delay="0"/>
+                            </p:stCondLst>
+                            <p:childTnLst>
+                              <p:par>
+                                <p:cTn id="5" presetID="1" presetClass="entr" presetSubtype="0" fill="hold" nodeType="clickEffect">
+                                  <p:stCondLst>
+                                    <p:cond delay="0"/>
+                                  </p:stCondLst>
+                                  <p:childTnLst>
+                                    <p:set>
+                                      <p:cBhvr>
+                                        <p:cTn id="6" dur="1" fill="hold">
+                                          <p:stCondLst>
+                                            <p:cond delay="0"/>
+                                          </p:stCondLst>
+                                        </p:cTn>
+                                        <p:tgtEl>
+                                          <p:spTgt spid="3">
+                                            <p:txEl>
+                                              <p:pRg st="0" end="0"/>
+                                            </p:txEl>
+                                          </p:spTgt>
+                                        </p:tgtEl>
+                                        <p:attrNameLst>
+                                          <p:attrName>style.visibility</p:attrName>
+                                        </p:attrNameLst>
+                                      </p:cBhvr>
+                                      <p:to>
+                                        <p:strVal val="visible"/>
+                                      </p:to>
+                                    </p:set>
+                                  </p:childTnLst>
+                                </p:cTn>
+                              </p:par>
+                              <p:par>
+                                <p:cTn id="7" presetID="1" presetClass="entr" presetSubtype="0" fill="hold" nodeType="withEffect">
+                                  <p:stCondLst>
+                                    <p:cond delay="0"/>
+                                  </p:stCondLst>
+                                  <p:childTnLst>
+                                    <p:set>
+                                      <p:cBhvr>
+                                        <p:cTn id="8" dur="1" fill="hold">
+                                          <p:stCondLst>
+                                            <p:cond delay="0"/>
+                                          </p:stCondLst>
+                                        </p:cTn>
+                                        <p:tgtEl>
+                                          <p:spTgt spid="3">
+                                            <p:txEl>
+                                              <p:pRg st="1" end="1"/>
+                                            </p:txEl>
+                                          </p:spTgt>
+                                        </p:tgtEl>
+                                        <p:attrNameLst>
+                                          <p:attrName>style.visibility</p:attrName>
+                                        </p:attrNameLst>
+                                      </p:cBhvr>
+                                      <p:to>
+                                        <p:strVal val="visible"/>
+                                      </p:to>
+                                    </p:set>
+                                  </p:childTnLst>
+                                </p:cTn>
+                              </p:par>
+                            </p:childTnLst>
+                          </p:cTn>
+                        </p:par>
+                      </p:childTnLst>
+                    </p:cTn>
+                  </p:par>
+                  <p:par>
+                    <p:cTn id="9" fill="hold">
+                      <p:stCondLst>
+                        <p:cond delay="indefinite"/>
+                      </p:stCondLst>
+                      <p:childTnLst>
+                        <p:par>
+                          <p:cTn id="10" fill="hold">
+                            <p:stCondLst>
+                              <p:cond delay="0"/>
+                            </p:stCondLst>
+                            <p:childTnLst>
+                              <p:par>
+                                <p:cTn id="11" presetID="1" presetClass="entr" presetSubtype="0" fill="hold" nodeType="clickEffect">
+                                  <p:stCondLst>
+                                    <p:cond delay="0"/>
+                                  </p:stCondLst>
+                                  <p:childTnLst>
+                                    <p:set>
+                                      <p:cBhvr>
+                                        <p:cTn id="12" dur="1" fill="hold">
+                                          <p:stCondLst>
+                                            <p:cond delay="0"/>
+                                          </p:stCondLst>
+                                        </p:cTn>
+                                        <p:tgtEl>
+                                          <p:spTgt spid="3">
+                                            <p:txEl>
+                                              <p:pRg st="2" end="2"/>
+                                            </p:txEl>
+                                          </p:spTgt>
+                                        </p:tgtEl>
+                                        <p:attrNameLst>
+                                          <p:attrName>style.visibility</p:attrName>
+                                        </p:attrNameLst>
+                                      </p:cBhvr>
+                                      <p:to>
+                                        <p:strVal val="visible"/>
+                                      </p:to>
+                                    </p:set>
+                                  </p:childTnLst>
+                                </p:cTn>
+                              </p:par>
+                              <p:par>
+                                <p:cTn id="13" presetID="1" presetClass="entr" presetSubtype="0" fill="hold" nodeType="withEffect">
+                                  <p:stCondLst>
+                                    <p:cond delay="0"/>
+                                  </p:stCondLst>
+                                  <p:childTnLst>
+                                    <p:set>
+                                      <p:cBhvr>
+                                        <p:cTn id="14" dur="1" fill="hold">
+                                          <p:stCondLst>
+                                            <p:cond delay="0"/>
+                                          </p:stCondLst>
+                                        </p:cTn>
+                                        <p:tgtEl>
+                                          <p:spTgt spid="3">
+                                            <p:txEl>
+                                              <p:pRg st="3" end="3"/>
+                                            </p:txEl>
+                                          </p:spTgt>
+                                        </p:tgtEl>
+                                        <p:attrNameLst>
+                                          <p:attrName>style.visibility</p:attrName>
+                                        </p:attrNameLst>
+                                      </p:cBhvr>
+                                      <p:to>
+                                        <p:strVal val="visible"/>
+                                      </p:to>
+                                    </p:set>
+                                  </p:childTnLst>
+                                </p:cTn>
+                              </p:par>
+                            </p:childTnLst>
+                          </p:cTn>
+                        </p:par>
+                      </p:childTnLst>
+                    </p:cTn>
+                  </p:par>
+                  <p:par>
+                    <p:cTn id="15" fill="hold">
+                      <p:stCondLst>
+                        <p:cond delay="indefinite"/>
+                      </p:stCondLst>
+                      <p:childTnLst>
+                        <p:par>
+                          <p:cTn id="16" fill="hold">
+                            <p:stCondLst>
+                              <p:cond delay="0"/>
+                            </p:stCondLst>
+                            <p:childTnLst>
+                              <p:par>
+                                <p:cTn id="17" presetID="1" presetClass="entr" presetSubtype="0" fill="hold" nodeType="clickEffect">
+                                  <p:stCondLst>
+                                    <p:cond delay="0"/>
+                                  </p:stCondLst>
+                                  <p:childTnLst>
+                                    <p:set>
+                                      <p:cBhvr>
+                                        <p:cTn id="18" dur="1" fill="hold">
+                                          <p:stCondLst>
+                                            <p:cond delay="0"/>
+                                          </p:stCondLst>
+                                        </p:cTn>
+                                        <p:tgtEl>
+                                          <p:spTgt spid="3">
+                                            <p:txEl>
+                                              <p:pRg st="4" end="4"/>
+                                            </p:txEl>
+                                          </p:spTgt>
+                                        </p:tgtEl>
+                                        <p:attrNameLst>
+                                          <p:attrName>style.visibility</p:attrName>
+                                        </p:attrNameLst>
+                                      </p:cBhvr>
+                                      <p:to>
+                                        <p:strVal val="visible"/>
+                                      </p:to>
+                                    </p:set>
+                                  </p:childTnLst>
+                                </p:cTn>
+                              </p:par>
+                              <p:par>
+                                <p:cTn id="19" presetID="1" presetClass="entr" presetSubtype="0" fill="hold" nodeType="withEffect">
+                                  <p:stCondLst>
+                                    <p:cond delay="0"/>
+                                  </p:stCondLst>
+                                  <p:childTnLst>
+                                    <p:set>
+                                      <p:cBhvr>
+                                        <p:cTn id="20" dur="1" fill="hold">
+                                          <p:stCondLst>
+                                            <p:cond delay="0"/>
+                                          </p:stCondLst>
+                                        </p:cTn>
+                                        <p:tgtEl>
+                                          <p:spTgt spid="3">
+                                            <p:txEl>
+                                              <p:pRg st="5" end="5"/>
+                                            </p:txEl>
+                                          </p:spTgt>
+                                        </p:tgtEl>
+                                        <p:attrNameLst>
+                                          <p:attrName>style.visibility</p:attrName>
+                                        </p:attrNameLst>
+                                      </p:cBhvr>
+                                      <p:to>
+                                        <p:strVal val="visible"/>
+                                      </p:to>
+                                    </p:set>
+                                  </p:childTnLst>
+                                </p:cTn>
+                              </p:par>
+                              <p:par>
+                                <p:cTn id="21" presetID="1" presetClass="entr" presetSubtype="0" fill="hold" nodeType="withEffect">
+                                  <p:stCondLst>
+                                    <p:cond delay="0"/>
+                                  </p:stCondLst>
+                                  <p:childTnLst>
+                                    <p:set>
+                                      <p:cBhvr>
+                                        <p:cTn id="22" dur="1" fill="hold">
+                                          <p:stCondLst>
+                                            <p:cond delay="0"/>
+                                          </p:stCondLst>
+                                        </p:cTn>
+                                        <p:tgtEl>
+                                          <p:spTgt spid="3">
+                                            <p:txEl>
+                                              <p:pRg st="6" end="6"/>
+                                            </p:txEl>
+                                          </p:spTgt>
+                                        </p:tgtEl>
+                                        <p:attrNameLst>
+                                          <p:attrName>style.visibility</p:attrName>
+                                        </p:attrNameLst>
+                                      </p:cBhvr>
+                                      <p:to>
+                                        <p:strVal val="visible"/>
+                                      </p:to>
+                                    </p:set>
+                                  </p:childTnLst>
+                                </p:cTn>
+                              </p:par>
+                            </p:childTnLst>
+                          </p:cTn>
+                        </p:par>
+                      </p:childTnLst>
+                    </p:cTn>
+                  </p:par>
+                </p:childTnLst>
+              </p:cTn>
+              <p:prevCondLst>
+                <p:cond evt="onPrev" delay="0">
+                  <p:tgtEl>
+                    <p:sldTgt/>
+                  </p:tgtEl>
+                </p:cond>
+              </p:prevCondLst>
+              <p:nextCondLst>
+                <p:cond evt="onNext" delay="0">
+                  <p:tgtEl>
+                    <p:sldTgt/>
+                  </p:tgtEl>
+                </p:cond>
+              </p:nextCondLst>
+            </p:seq>
+          </p:childTnLst>
+        </p:cTn>
+      </p:par>
+    </p:tnLst>
+  </p:timing>
 </p:sld>
 </file>
 
@@ -8300,21 +10377,21 @@
 </file>
 
 <file path=customXml/item1.xml><?xml version="1.0" encoding="utf-8"?>
+<?mso-contentType ?>
+<FormTemplates xmlns="http://schemas.microsoft.com/sharepoint/v3/contenttype/forms">
+  <Display>DocumentLibraryForm</Display>
+  <Edit>DocumentLibraryForm</Edit>
+  <New>DocumentLibraryForm</New>
+</FormTemplates>
+</file>
+
+<file path=customXml/item2.xml><?xml version="1.0" encoding="utf-8"?>
 <p:properties xmlns:p="http://schemas.microsoft.com/office/2006/metadata/properties" xmlns:xsi="http://www.w3.org/2001/XMLSchema-instance" xmlns:pc="http://schemas.microsoft.com/office/infopath/2007/PartnerControls">
   <documentManagement>
     <Status xmlns="71af3243-3dd4-4a8d-8c0d-dd76da1f02a5">Not started</Status>
     <MediaServiceKeyPoints xmlns="71af3243-3dd4-4a8d-8c0d-dd76da1f02a5" xsi:nil="true"/>
   </documentManagement>
 </p:properties>
-</file>
-
-<file path=customXml/item2.xml><?xml version="1.0" encoding="utf-8"?>
-<?mso-contentType ?>
-<FormTemplates xmlns="http://schemas.microsoft.com/sharepoint/v3/contenttype/forms">
-  <Display>DocumentLibraryForm</Display>
-  <Edit>DocumentLibraryForm</Edit>
-  <New>DocumentLibraryForm</New>
-</FormTemplates>
 </file>
 
 <file path=customXml/item3.xml><?xml version="1.0" encoding="utf-8"?>
@@ -8539,19 +10616,19 @@
 </file>
 
 <file path=customXml/itemProps1.xml><?xml version="1.0" encoding="utf-8"?>
+<ds:datastoreItem xmlns:ds="http://schemas.openxmlformats.org/officeDocument/2006/customXml" ds:itemID="{64B270AB-C138-415C-897E-3C24487DECF1}">
+  <ds:schemaRefs>
+    <ds:schemaRef ds:uri="http://schemas.microsoft.com/sharepoint/v3/contenttype/forms"/>
+  </ds:schemaRefs>
+</ds:datastoreItem>
+</file>
+
+<file path=customXml/itemProps2.xml><?xml version="1.0" encoding="utf-8"?>
 <ds:datastoreItem xmlns:ds="http://schemas.openxmlformats.org/officeDocument/2006/customXml" ds:itemID="{2C4C00F4-06E9-43E3-AD97-88A857CEFA82}">
   <ds:schemaRefs>
     <ds:schemaRef ds:uri="http://schemas.microsoft.com/office/2006/metadata/properties"/>
     <ds:schemaRef ds:uri="http://schemas.microsoft.com/office/infopath/2007/PartnerControls"/>
     <ds:schemaRef ds:uri="71af3243-3dd4-4a8d-8c0d-dd76da1f02a5"/>
-  </ds:schemaRefs>
-</ds:datastoreItem>
-</file>
-
-<file path=customXml/itemProps2.xml><?xml version="1.0" encoding="utf-8"?>
-<ds:datastoreItem xmlns:ds="http://schemas.openxmlformats.org/officeDocument/2006/customXml" ds:itemID="{64B270AB-C138-415C-897E-3C24487DECF1}">
-  <ds:schemaRefs>
-    <ds:schemaRef ds:uri="http://schemas.microsoft.com/sharepoint/v3/contenttype/forms"/>
   </ds:schemaRefs>
 </ds:datastoreItem>
 </file>

</xml_diff>

<commit_message>
Project Report, Minor Presentation Updates
</commit_message>
<xml_diff>
--- a/Reports/Guided Capstone Presentation.pptx
+++ b/Reports/Guided Capstone Presentation.pptx
@@ -204,7 +204,7 @@
           <a:p>
             <a:fld id="{AFD01546-198A-4195-BCF8-F0FF54C90E5E}" type="datetimeFigureOut">
               <a:rPr lang="en-US" smtClean="0"/>
-              <a:t>2/4/2021</a:t>
+              <a:t>2/6/2021</a:t>
             </a:fld>
             <a:endParaRPr lang="en-US" dirty="0"/>
           </a:p>
@@ -656,7 +656,7 @@
           <a:p>
             <a:fld id="{88D38747-4367-4BD2-8D51-C97E202738E2}" type="datetime1">
               <a:rPr lang="en-US" smtClean="0"/>
-              <a:t>2/4/2021</a:t>
+              <a:t>2/6/2021</a:t>
             </a:fld>
             <a:endParaRPr lang="en-US" dirty="0"/>
           </a:p>
@@ -961,7 +961,7 @@
           <a:p>
             <a:fld id="{11F1B079-7EF0-44EE-B798-BCC497C9F3B2}" type="datetime1">
               <a:rPr lang="en-US" smtClean="0"/>
-              <a:t>2/4/2021</a:t>
+              <a:t>2/6/2021</a:t>
             </a:fld>
             <a:endParaRPr lang="en-US" dirty="0"/>
           </a:p>
@@ -1155,7 +1155,7 @@
           <a:p>
             <a:fld id="{28FF70A8-1D13-4657-95F0-A9EA54967B8D}" type="datetime1">
               <a:rPr lang="en-US" smtClean="0"/>
-              <a:t>2/4/2021</a:t>
+              <a:t>2/6/2021</a:t>
             </a:fld>
             <a:endParaRPr lang="en-US" dirty="0"/>
           </a:p>
@@ -1418,7 +1418,7 @@
           <a:p>
             <a:fld id="{21EB90AC-71BD-4C7F-8ACA-7B3F18292E63}" type="datetime1">
               <a:rPr lang="en-US" smtClean="0"/>
-              <a:t>2/4/2021</a:t>
+              <a:t>2/6/2021</a:t>
             </a:fld>
             <a:endParaRPr lang="en-US" dirty="0"/>
           </a:p>
@@ -1854,7 +1854,7 @@
           <a:p>
             <a:fld id="{4E6EFC2C-8905-46F0-B443-CE905B76BA01}" type="datetime1">
               <a:rPr lang="en-US" smtClean="0"/>
-              <a:t>2/4/2021</a:t>
+              <a:t>2/6/2021</a:t>
             </a:fld>
             <a:endParaRPr lang="en-US" dirty="0"/>
           </a:p>
@@ -2391,7 +2391,7 @@
           <a:p>
             <a:fld id="{D9079DC3-C9B5-499E-9140-0DC28B7074E2}" type="datetime1">
               <a:rPr lang="en-US" smtClean="0"/>
-              <a:t>2/4/2021</a:t>
+              <a:t>2/6/2021</a:t>
             </a:fld>
             <a:endParaRPr lang="en-US" dirty="0"/>
           </a:p>
@@ -3273,7 +3273,7 @@
           <a:p>
             <a:fld id="{30BB33EA-E472-4D22-9C03-A9C14AA21CED}" type="datetime1">
               <a:rPr lang="en-US" smtClean="0"/>
-              <a:t>2/4/2021</a:t>
+              <a:t>2/6/2021</a:t>
             </a:fld>
             <a:endParaRPr lang="en-US" dirty="0"/>
           </a:p>
@@ -3443,7 +3443,7 @@
           <a:p>
             <a:fld id="{73C55A3C-5767-4844-A0A3-83778C2E5409}" type="datetime1">
               <a:rPr lang="en-US" smtClean="0"/>
-              <a:t>2/4/2021</a:t>
+              <a:t>2/6/2021</a:t>
             </a:fld>
             <a:endParaRPr lang="en-US" dirty="0"/>
           </a:p>
@@ -3687,7 +3687,7 @@
           <a:p>
             <a:fld id="{CAE507A8-A5CF-4D38-AB86-7EDDA87A85D4}" type="datetime1">
               <a:rPr lang="en-US" smtClean="0"/>
-              <a:t>2/4/2021</a:t>
+              <a:t>2/6/2021</a:t>
             </a:fld>
             <a:endParaRPr lang="en-US" dirty="0"/>
           </a:p>
@@ -3929,7 +3929,7 @@
           <a:p>
             <a:fld id="{BDFCD27C-8599-43EF-BA1D-14DDC1946E06}" type="datetime1">
               <a:rPr lang="en-US" smtClean="0"/>
-              <a:t>2/4/2021</a:t>
+              <a:t>2/6/2021</a:t>
             </a:fld>
             <a:endParaRPr lang="en-US" dirty="0"/>
           </a:p>
@@ -4412,7 +4412,7 @@
           <a:p>
             <a:fld id="{49343D99-809A-49C0-96E5-4250D0B498EE}" type="datetime1">
               <a:rPr lang="en-US" smtClean="0"/>
-              <a:t>2/4/2021</a:t>
+              <a:t>2/6/2021</a:t>
             </a:fld>
             <a:endParaRPr lang="en-US" dirty="0"/>
           </a:p>
@@ -4530,7 +4530,7 @@
           <a:p>
             <a:fld id="{A143DE9B-B678-4EFB-BB7D-A4370204A0B0}" type="datetime1">
               <a:rPr lang="en-US" smtClean="0"/>
-              <a:t>2/4/2021</a:t>
+              <a:t>2/6/2021</a:t>
             </a:fld>
             <a:endParaRPr lang="en-US" dirty="0"/>
           </a:p>
@@ -4625,7 +4625,7 @@
           <a:p>
             <a:fld id="{E68812DA-F765-4142-A6A3-A8ED7235E082}" type="datetime1">
               <a:rPr lang="en-US" smtClean="0"/>
-              <a:t>2/4/2021</a:t>
+              <a:t>2/6/2021</a:t>
             </a:fld>
             <a:endParaRPr lang="en-US" dirty="0"/>
           </a:p>
@@ -4880,7 +4880,7 @@
           <a:p>
             <a:fld id="{3E0277FD-7DE6-41D4-930D-AC99F5AFE54E}" type="datetime1">
               <a:rPr lang="en-US" smtClean="0"/>
-              <a:t>2/4/2021</a:t>
+              <a:t>2/6/2021</a:t>
             </a:fld>
             <a:endParaRPr lang="en-US" dirty="0"/>
           </a:p>
@@ -5187,7 +5187,7 @@
           <a:p>
             <a:fld id="{9EA15526-7079-4B7B-987C-1B5FAE11A0FF}" type="datetime1">
               <a:rPr lang="en-US" smtClean="0"/>
-              <a:t>2/4/2021</a:t>
+              <a:t>2/6/2021</a:t>
             </a:fld>
             <a:endParaRPr lang="en-US" dirty="0"/>
           </a:p>
@@ -5422,7 +5422,7 @@
           <a:p>
             <a:fld id="{073ED0CC-082F-4160-86E5-0D6041F12778}" type="datetime1">
               <a:rPr lang="en-US" smtClean="0"/>
-              <a:t>2/4/2021</a:t>
+              <a:t>2/6/2021</a:t>
             </a:fld>
             <a:endParaRPr lang="en-US" dirty="0"/>
           </a:p>
@@ -6340,7 +6340,7 @@
           </a:effectLst>
           <a:extLst>
             <a:ext uri="{91240B29-F687-4f45-9708-019B960494DF}">
-              <a14:hiddenLine xmlns:a16="http://schemas.microsoft.com/office/drawing/2014/main" xmlns:p14="http://schemas.microsoft.com/office/powerpoint/2010/main" xmlns:a14="http://schemas.microsoft.com/office/drawing/2010/main" xmlns="" w="9525">
+              <a14:hiddenLine xmlns="" xmlns:a14="http://schemas.microsoft.com/office/drawing/2010/main" xmlns:p14="http://schemas.microsoft.com/office/powerpoint/2010/main" xmlns:a16="http://schemas.microsoft.com/office/drawing/2014/main" w="9525">
                 <a:solidFill>
                   <a:srgbClr val="000000"/>
                 </a:solidFill>
@@ -7695,7 +7695,7 @@
         </p:spPr>
         <p:txBody>
           <a:bodyPr vert="horz" lIns="91440" tIns="45720" rIns="91440" bIns="45720" rtlCol="0" anchor="t">
-            <a:normAutofit fontScale="92500" lnSpcReduction="20000"/>
+            <a:normAutofit/>
           </a:bodyPr>
           <a:lstStyle>
             <a:lvl1pPr marL="342900" indent="-306000" algn="l" defTabSz="457200" rtl="0" eaLnBrk="1" latinLnBrk="0" hangingPunct="1">
@@ -8052,17 +8052,6 @@
               <a:rPr lang="en-US" b="1" dirty="0"/>
               <a:t>Key Finding: At minimum, the model supports a minimum $4 increase to ticket price, yielding an estimated 7 million in added revenue for the year.</a:t>
             </a:r>
-            <a:r>
-              <a:rPr lang="en-US" dirty="0"/>
-              <a:t> Considering the maximum absolute error of the model, the price could be reasonably increased anywhere from $4 to $25 dollars.</a:t>
-            </a:r>
-          </a:p>
-          <a:p>
-            <a:pPr marL="36900" indent="0" algn="ctr">
-              <a:buFont typeface="Wingdings 2" charset="2"/>
-              <a:buNone/>
-            </a:pPr>
-            <a:endParaRPr lang="en-US" b="1" dirty="0"/>
           </a:p>
           <a:p>
             <a:pPr marL="36900" indent="0" algn="ctr">
@@ -8682,9 +8671,16 @@
             <p:ph sz="half" idx="1"/>
           </p:nvPr>
         </p:nvSpPr>
-        <p:spPr/>
-        <p:txBody>
-          <a:bodyPr/>
+        <p:spPr>
+          <a:xfrm>
+            <a:off x="415774" y="2084614"/>
+            <a:ext cx="4856841" cy="3622671"/>
+          </a:xfrm>
+        </p:spPr>
+        <p:txBody>
+          <a:bodyPr>
+            <a:normAutofit/>
+          </a:bodyPr>
           <a:lstStyle/>
           <a:p>
             <a:r>
@@ -8706,153 +8702,330 @@
           </a:p>
         </p:txBody>
       </p:sp>
-      <p:pic>
-        <p:nvPicPr>
-          <p:cNvPr id="5" name="Content Placeholder 15">
+      <p:grpSp>
+        <p:nvGrpSpPr>
+          <p:cNvPr id="7" name="Group 6">
             <a:extLst>
               <a:ext uri="{FF2B5EF4-FFF2-40B4-BE49-F238E27FC236}">
-                <a16:creationId xmlns:a16="http://schemas.microsoft.com/office/drawing/2014/main" id="{449D62E9-D2F3-459C-9F34-ACA4092866C5}"/>
+                <a16:creationId xmlns:a16="http://schemas.microsoft.com/office/drawing/2014/main" id="{E0304BFB-DA23-412C-9AD5-7B1FF5FD58B3}"/>
               </a:ext>
             </a:extLst>
           </p:cNvPr>
-          <p:cNvPicPr>
-            <a:picLocks noChangeAspect="1"/>
-          </p:cNvPicPr>
+          <p:cNvGrpSpPr/>
           <p:nvPr/>
-        </p:nvPicPr>
-        <p:blipFill>
-          <a:blip r:embed="rId2"/>
-          <a:stretch>
-            <a:fillRect/>
-          </a:stretch>
-        </p:blipFill>
-        <p:spPr>
+        </p:nvGrpSpPr>
+        <p:grpSpPr>
           <a:xfrm>
-            <a:off x="6457092" y="1680422"/>
-            <a:ext cx="4764087" cy="2431908"/>
+            <a:off x="5391849" y="1754950"/>
+            <a:ext cx="6611248" cy="2431908"/>
+            <a:chOff x="5391849" y="1754950"/>
+            <a:chExt cx="6611248" cy="2431908"/>
           </a:xfrm>
-          <a:prstGeom prst="rect">
-            <a:avLst/>
-          </a:prstGeom>
-          <a:effectLst>
-            <a:outerShdw blurRad="25400" dir="17880000">
-              <a:srgbClr val="000000">
-                <a:alpha val="46000"/>
-              </a:srgbClr>
-            </a:outerShdw>
-          </a:effectLst>
-        </p:spPr>
-      </p:pic>
-      <p:pic>
-        <p:nvPicPr>
-          <p:cNvPr id="8" name="Picture 7">
+        </p:grpSpPr>
+        <p:grpSp>
+          <p:nvGrpSpPr>
+            <p:cNvPr id="4" name="Group 3">
+              <a:extLst>
+                <a:ext uri="{FF2B5EF4-FFF2-40B4-BE49-F238E27FC236}">
+                  <a16:creationId xmlns:a16="http://schemas.microsoft.com/office/drawing/2014/main" id="{737EA61A-B5CC-4A52-9289-28F241877F9D}"/>
+                </a:ext>
+              </a:extLst>
+            </p:cNvPr>
+            <p:cNvGrpSpPr/>
+            <p:nvPr/>
+          </p:nvGrpSpPr>
+          <p:grpSpPr>
+            <a:xfrm>
+              <a:off x="5391849" y="1754950"/>
+              <a:ext cx="4764087" cy="2431908"/>
+              <a:chOff x="6232771" y="1680422"/>
+              <a:chExt cx="4764087" cy="2431908"/>
+            </a:xfrm>
+          </p:grpSpPr>
+          <p:pic>
+            <p:nvPicPr>
+              <p:cNvPr id="5" name="Content Placeholder 15">
+                <a:extLst>
+                  <a:ext uri="{FF2B5EF4-FFF2-40B4-BE49-F238E27FC236}">
+                    <a16:creationId xmlns:a16="http://schemas.microsoft.com/office/drawing/2014/main" id="{449D62E9-D2F3-459C-9F34-ACA4092866C5}"/>
+                  </a:ext>
+                </a:extLst>
+              </p:cNvPr>
+              <p:cNvPicPr>
+                <a:picLocks noChangeAspect="1"/>
+              </p:cNvPicPr>
+              <p:nvPr/>
+            </p:nvPicPr>
+            <p:blipFill>
+              <a:blip r:embed="rId2"/>
+              <a:stretch>
+                <a:fillRect/>
+              </a:stretch>
+            </p:blipFill>
+            <p:spPr>
+              <a:xfrm>
+                <a:off x="6232771" y="1680422"/>
+                <a:ext cx="4764087" cy="2431908"/>
+              </a:xfrm>
+              <a:prstGeom prst="rect">
+                <a:avLst/>
+              </a:prstGeom>
+              <a:effectLst>
+                <a:outerShdw blurRad="25400" dir="17880000">
+                  <a:srgbClr val="000000">
+                    <a:alpha val="46000"/>
+                  </a:srgbClr>
+                </a:outerShdw>
+              </a:effectLst>
+            </p:spPr>
+          </p:pic>
+          <p:sp>
+            <p:nvSpPr>
+              <p:cNvPr id="9" name="TextBox 8">
+                <a:extLst>
+                  <a:ext uri="{FF2B5EF4-FFF2-40B4-BE49-F238E27FC236}">
+                    <a16:creationId xmlns:a16="http://schemas.microsoft.com/office/drawing/2014/main" id="{8C1AA0CE-F424-43C2-823A-310900CF49B1}"/>
+                  </a:ext>
+                </a:extLst>
+              </p:cNvPr>
+              <p:cNvSpPr txBox="1"/>
+              <p:nvPr/>
+            </p:nvSpPr>
+            <p:spPr>
+              <a:xfrm>
+                <a:off x="8744430" y="2104786"/>
+                <a:ext cx="1645920" cy="923330"/>
+              </a:xfrm>
+              <a:prstGeom prst="rect">
+                <a:avLst/>
+              </a:prstGeom>
+              <a:noFill/>
+            </p:spPr>
+            <p:txBody>
+              <a:bodyPr wrap="square" rtlCol="0">
+                <a:spAutoFit/>
+              </a:bodyPr>
+              <a:lstStyle/>
+              <a:p>
+                <a:pPr algn="ctr"/>
+                <a:r>
+                  <a:rPr lang="en-US" b="1" dirty="0">
+                    <a:solidFill>
+                      <a:schemeClr val="bg1"/>
+                    </a:solidFill>
+                  </a:rPr>
+                  <a:t>Resort Ticket Price Across Market</a:t>
+                </a:r>
+              </a:p>
+            </p:txBody>
+          </p:sp>
+        </p:grpSp>
+        <p:sp>
+          <p:nvSpPr>
+            <p:cNvPr id="11" name="TextBox 10">
+              <a:extLst>
+                <a:ext uri="{FF2B5EF4-FFF2-40B4-BE49-F238E27FC236}">
+                  <a16:creationId xmlns:a16="http://schemas.microsoft.com/office/drawing/2014/main" id="{09147E01-EF5E-4859-A514-87CA45FE74AB}"/>
+                </a:ext>
+              </a:extLst>
+            </p:cNvPr>
+            <p:cNvSpPr txBox="1"/>
+            <p:nvPr/>
+          </p:nvSpPr>
+          <p:spPr>
+            <a:xfrm>
+              <a:off x="9750669" y="2179314"/>
+              <a:ext cx="2252428" cy="1200329"/>
+            </a:xfrm>
+            <a:prstGeom prst="rect">
+              <a:avLst/>
+            </a:prstGeom>
+            <a:noFill/>
+          </p:spPr>
+          <p:txBody>
+            <a:bodyPr wrap="square">
+              <a:spAutoFit/>
+            </a:bodyPr>
+            <a:lstStyle/>
+            <a:p>
+              <a:pPr lvl="1" algn="ctr"/>
+              <a:r>
+                <a:rPr lang="en-US" dirty="0"/>
+                <a:t>Market Quartiles:</a:t>
+              </a:r>
+            </a:p>
+            <a:p>
+              <a:pPr lvl="1" algn="ctr"/>
+              <a:r>
+                <a:rPr lang="en-US" dirty="0"/>
+                <a:t> 47, 60, 78 </a:t>
+              </a:r>
+            </a:p>
+            <a:p>
+              <a:pPr lvl="1" algn="ctr"/>
+              <a:r>
+                <a:rPr lang="en-US" dirty="0"/>
+                <a:t>Big Mountain:</a:t>
+              </a:r>
+            </a:p>
+            <a:p>
+              <a:pPr lvl="1" algn="ctr"/>
+              <a:r>
+                <a:rPr lang="en-US" dirty="0"/>
+                <a:t>81</a:t>
+              </a:r>
+            </a:p>
+          </p:txBody>
+        </p:sp>
+      </p:grpSp>
+      <p:grpSp>
+        <p:nvGrpSpPr>
+          <p:cNvPr id="13" name="Group 12">
             <a:extLst>
               <a:ext uri="{FF2B5EF4-FFF2-40B4-BE49-F238E27FC236}">
-                <a16:creationId xmlns:a16="http://schemas.microsoft.com/office/drawing/2014/main" id="{7791DA73-8EF1-442C-80F2-149305457489}"/>
+                <a16:creationId xmlns:a16="http://schemas.microsoft.com/office/drawing/2014/main" id="{E44D57DD-B57A-4873-B5F6-2DFB9E856040}"/>
               </a:ext>
             </a:extLst>
           </p:cNvPr>
-          <p:cNvPicPr>
-            <a:picLocks noChangeAspect="1"/>
-          </p:cNvPicPr>
+          <p:cNvGrpSpPr/>
           <p:nvPr/>
-        </p:nvPicPr>
-        <p:blipFill>
-          <a:blip r:embed="rId3"/>
-          <a:stretch>
-            <a:fillRect/>
-          </a:stretch>
-        </p:blipFill>
-        <p:spPr>
+        </p:nvGrpSpPr>
+        <p:grpSpPr>
           <a:xfrm>
-            <a:off x="6457092" y="4186858"/>
-            <a:ext cx="4764087" cy="2401039"/>
+            <a:off x="5391849" y="4333816"/>
+            <a:ext cx="6613490" cy="2401039"/>
+            <a:chOff x="5391849" y="4333816"/>
+            <a:chExt cx="6613490" cy="2401039"/>
           </a:xfrm>
-          <a:prstGeom prst="rect">
-            <a:avLst/>
-          </a:prstGeom>
-        </p:spPr>
-      </p:pic>
-      <p:sp>
-        <p:nvSpPr>
-          <p:cNvPr id="9" name="TextBox 8">
-            <a:extLst>
-              <a:ext uri="{FF2B5EF4-FFF2-40B4-BE49-F238E27FC236}">
-                <a16:creationId xmlns:a16="http://schemas.microsoft.com/office/drawing/2014/main" id="{8C1AA0CE-F424-43C2-823A-310900CF49B1}"/>
-              </a:ext>
-            </a:extLst>
-          </p:cNvPr>
-          <p:cNvSpPr txBox="1"/>
-          <p:nvPr/>
-        </p:nvSpPr>
-        <p:spPr>
-          <a:xfrm>
-            <a:off x="9107424" y="2076451"/>
-            <a:ext cx="1645920" cy="923330"/>
-          </a:xfrm>
-          <a:prstGeom prst="rect">
-            <a:avLst/>
-          </a:prstGeom>
-          <a:noFill/>
-        </p:spPr>
-        <p:txBody>
-          <a:bodyPr wrap="square" rtlCol="0">
-            <a:spAutoFit/>
-          </a:bodyPr>
-          <a:lstStyle/>
-          <a:p>
-            <a:pPr algn="ctr"/>
-            <a:r>
-              <a:rPr lang="en-US" b="1" dirty="0">
-                <a:solidFill>
-                  <a:schemeClr val="bg1"/>
-                </a:solidFill>
-              </a:rPr>
-              <a:t>Resort Ticket Price Across Market</a:t>
-            </a:r>
-          </a:p>
-        </p:txBody>
-      </p:sp>
-      <p:sp>
-        <p:nvSpPr>
-          <p:cNvPr id="10" name="TextBox 9">
-            <a:extLst>
-              <a:ext uri="{FF2B5EF4-FFF2-40B4-BE49-F238E27FC236}">
-                <a16:creationId xmlns:a16="http://schemas.microsoft.com/office/drawing/2014/main" id="{5708C673-F263-4A1A-8538-BECE0DFB148A}"/>
-              </a:ext>
-            </a:extLst>
-          </p:cNvPr>
-          <p:cNvSpPr txBox="1"/>
-          <p:nvPr/>
-        </p:nvSpPr>
-        <p:spPr>
-          <a:xfrm>
-            <a:off x="8510016" y="4516925"/>
-            <a:ext cx="1645920" cy="923330"/>
-          </a:xfrm>
-          <a:prstGeom prst="rect">
-            <a:avLst/>
-          </a:prstGeom>
-          <a:noFill/>
-        </p:spPr>
-        <p:txBody>
-          <a:bodyPr wrap="square" rtlCol="0">
-            <a:spAutoFit/>
-          </a:bodyPr>
-          <a:lstStyle/>
-          <a:p>
-            <a:pPr algn="ctr"/>
-            <a:r>
-              <a:rPr lang="en-US" b="1" dirty="0">
-                <a:solidFill>
-                  <a:schemeClr val="bg1"/>
-                </a:solidFill>
-              </a:rPr>
-              <a:t>Snow Making Acreage Across Market</a:t>
-            </a:r>
-          </a:p>
-        </p:txBody>
-      </p:sp>
+        </p:grpSpPr>
+        <p:pic>
+          <p:nvPicPr>
+            <p:cNvPr id="8" name="Picture 7">
+              <a:extLst>
+                <a:ext uri="{FF2B5EF4-FFF2-40B4-BE49-F238E27FC236}">
+                  <a16:creationId xmlns:a16="http://schemas.microsoft.com/office/drawing/2014/main" id="{7791DA73-8EF1-442C-80F2-149305457489}"/>
+                </a:ext>
+              </a:extLst>
+            </p:cNvPr>
+            <p:cNvPicPr>
+              <a:picLocks noChangeAspect="1"/>
+            </p:cNvPicPr>
+            <p:nvPr/>
+          </p:nvPicPr>
+          <p:blipFill>
+            <a:blip r:embed="rId3"/>
+            <a:stretch>
+              <a:fillRect/>
+            </a:stretch>
+          </p:blipFill>
+          <p:spPr>
+            <a:xfrm>
+              <a:off x="5391849" y="4333816"/>
+              <a:ext cx="4764087" cy="2401039"/>
+            </a:xfrm>
+            <a:prstGeom prst="rect">
+              <a:avLst/>
+            </a:prstGeom>
+          </p:spPr>
+        </p:pic>
+        <p:sp>
+          <p:nvSpPr>
+            <p:cNvPr id="10" name="TextBox 9">
+              <a:extLst>
+                <a:ext uri="{FF2B5EF4-FFF2-40B4-BE49-F238E27FC236}">
+                  <a16:creationId xmlns:a16="http://schemas.microsoft.com/office/drawing/2014/main" id="{5708C673-F263-4A1A-8538-BECE0DFB148A}"/>
+                </a:ext>
+              </a:extLst>
+            </p:cNvPr>
+            <p:cNvSpPr txBox="1"/>
+            <p:nvPr/>
+          </p:nvSpPr>
+          <p:spPr>
+            <a:xfrm>
+              <a:off x="7443542" y="4721032"/>
+              <a:ext cx="1645920" cy="923330"/>
+            </a:xfrm>
+            <a:prstGeom prst="rect">
+              <a:avLst/>
+            </a:prstGeom>
+            <a:noFill/>
+          </p:spPr>
+          <p:txBody>
+            <a:bodyPr wrap="square" rtlCol="0">
+              <a:spAutoFit/>
+            </a:bodyPr>
+            <a:lstStyle/>
+            <a:p>
+              <a:pPr algn="ctr"/>
+              <a:r>
+                <a:rPr lang="en-US" b="1" dirty="0">
+                  <a:solidFill>
+                    <a:schemeClr val="bg1"/>
+                  </a:solidFill>
+                </a:rPr>
+                <a:t>Snow Making Acreage Across Market</a:t>
+              </a:r>
+            </a:p>
+          </p:txBody>
+        </p:sp>
+        <p:sp>
+          <p:nvSpPr>
+            <p:cNvPr id="12" name="TextBox 11">
+              <a:extLst>
+                <a:ext uri="{FF2B5EF4-FFF2-40B4-BE49-F238E27FC236}">
+                  <a16:creationId xmlns:a16="http://schemas.microsoft.com/office/drawing/2014/main" id="{7DB58831-985A-49BF-85D5-0308D35FB40F}"/>
+                </a:ext>
+              </a:extLst>
+            </p:cNvPr>
+            <p:cNvSpPr txBox="1"/>
+            <p:nvPr/>
+          </p:nvSpPr>
+          <p:spPr>
+            <a:xfrm>
+              <a:off x="9752911" y="4820974"/>
+              <a:ext cx="2252428" cy="1200329"/>
+            </a:xfrm>
+            <a:prstGeom prst="rect">
+              <a:avLst/>
+            </a:prstGeom>
+            <a:noFill/>
+          </p:spPr>
+          <p:txBody>
+            <a:bodyPr wrap="square">
+              <a:spAutoFit/>
+            </a:bodyPr>
+            <a:lstStyle/>
+            <a:p>
+              <a:pPr lvl="1" algn="ctr"/>
+              <a:r>
+                <a:rPr lang="en-US" dirty="0"/>
+                <a:t>Market Quartiles:</a:t>
+              </a:r>
+            </a:p>
+            <a:p>
+              <a:pPr lvl="1" algn="ctr"/>
+              <a:r>
+                <a:rPr lang="en-US" dirty="0"/>
+                <a:t> 46, 100, 184 </a:t>
+              </a:r>
+            </a:p>
+            <a:p>
+              <a:pPr lvl="1" algn="ctr"/>
+              <a:r>
+                <a:rPr lang="en-US" dirty="0"/>
+                <a:t>Big Mountain:</a:t>
+              </a:r>
+            </a:p>
+            <a:p>
+              <a:pPr lvl="1" algn="ctr"/>
+              <a:r>
+                <a:rPr lang="en-US" dirty="0"/>
+                <a:t>600</a:t>
+              </a:r>
+            </a:p>
+          </p:txBody>
+        </p:sp>
+      </p:grpSp>
     </p:spTree>
     <p:extLst>
       <p:ext uri="{BB962C8B-B14F-4D97-AF65-F5344CB8AC3E}">
@@ -8929,7 +9102,12 @@
             <p:ph sz="half" idx="1"/>
           </p:nvPr>
         </p:nvSpPr>
-        <p:spPr/>
+        <p:spPr>
+          <a:xfrm>
+            <a:off x="496997" y="2099513"/>
+            <a:ext cx="4856841" cy="3622671"/>
+          </a:xfrm>
+        </p:spPr>
         <p:txBody>
           <a:bodyPr>
             <a:normAutofit fontScale="92500" lnSpcReduction="10000"/>
@@ -8961,73 +9139,6 @@
           </a:p>
         </p:txBody>
       </p:sp>
-      <p:pic>
-        <p:nvPicPr>
-          <p:cNvPr id="7" name="Content Placeholder 12">
-            <a:extLst>
-              <a:ext uri="{FF2B5EF4-FFF2-40B4-BE49-F238E27FC236}">
-                <a16:creationId xmlns:a16="http://schemas.microsoft.com/office/drawing/2014/main" id="{FE7F8A51-9B23-4BA8-AF50-67B762FC2BC3}"/>
-              </a:ext>
-            </a:extLst>
-          </p:cNvPr>
-          <p:cNvPicPr>
-            <a:picLocks noChangeAspect="1"/>
-          </p:cNvPicPr>
-          <p:nvPr/>
-        </p:nvPicPr>
-        <p:blipFill>
-          <a:blip r:embed="rId2"/>
-          <a:stretch>
-            <a:fillRect/>
-          </a:stretch>
-        </p:blipFill>
-        <p:spPr>
-          <a:xfrm>
-            <a:off x="6457092" y="4225104"/>
-            <a:ext cx="4779963" cy="2443948"/>
-          </a:xfrm>
-          <a:prstGeom prst="rect">
-            <a:avLst/>
-          </a:prstGeom>
-        </p:spPr>
-      </p:pic>
-      <p:pic>
-        <p:nvPicPr>
-          <p:cNvPr id="8" name="Content Placeholder 15">
-            <a:extLst>
-              <a:ext uri="{FF2B5EF4-FFF2-40B4-BE49-F238E27FC236}">
-                <a16:creationId xmlns:a16="http://schemas.microsoft.com/office/drawing/2014/main" id="{0801A880-12DB-41EE-B26B-3CCD120F9884}"/>
-              </a:ext>
-            </a:extLst>
-          </p:cNvPr>
-          <p:cNvPicPr>
-            <a:picLocks noChangeAspect="1"/>
-          </p:cNvPicPr>
-          <p:nvPr/>
-        </p:nvPicPr>
-        <p:blipFill>
-          <a:blip r:embed="rId3"/>
-          <a:stretch>
-            <a:fillRect/>
-          </a:stretch>
-        </p:blipFill>
-        <p:spPr>
-          <a:xfrm>
-            <a:off x="6457092" y="1690707"/>
-            <a:ext cx="4764087" cy="2431908"/>
-          </a:xfrm>
-          <a:prstGeom prst="rect">
-            <a:avLst/>
-          </a:prstGeom>
-          <a:effectLst>
-            <a:outerShdw blurRad="25400" dir="17880000">
-              <a:srgbClr val="000000">
-                <a:alpha val="46000"/>
-              </a:srgbClr>
-            </a:outerShdw>
-          </a:effectLst>
-        </p:spPr>
-      </p:pic>
       <p:sp>
         <p:nvSpPr>
           <p:cNvPr id="10" name="TextBox 9">
@@ -9042,7 +9153,7 @@
         </p:nvSpPr>
         <p:spPr>
           <a:xfrm>
-            <a:off x="7723632" y="4327594"/>
+            <a:off x="8277086" y="4713084"/>
             <a:ext cx="1645920" cy="646331"/>
           </a:xfrm>
           <a:prstGeom prst="rect">
@@ -9082,7 +9193,7 @@
         </p:nvSpPr>
         <p:spPr>
           <a:xfrm>
-            <a:off x="9107424" y="2076451"/>
+            <a:off x="7822650" y="2139617"/>
             <a:ext cx="1645920" cy="923330"/>
           </a:xfrm>
           <a:prstGeom prst="rect">
@@ -9108,6 +9219,222 @@
           </a:p>
         </p:txBody>
       </p:sp>
+      <p:grpSp>
+        <p:nvGrpSpPr>
+          <p:cNvPr id="6" name="Group 5">
+            <a:extLst>
+              <a:ext uri="{FF2B5EF4-FFF2-40B4-BE49-F238E27FC236}">
+                <a16:creationId xmlns:a16="http://schemas.microsoft.com/office/drawing/2014/main" id="{3CF7BD0D-B6FB-4EE3-A464-C1C0E5F3183D}"/>
+              </a:ext>
+            </a:extLst>
+          </p:cNvPr>
+          <p:cNvGrpSpPr/>
+          <p:nvPr/>
+        </p:nvGrpSpPr>
+        <p:grpSpPr>
+          <a:xfrm>
+            <a:off x="5345752" y="4239245"/>
+            <a:ext cx="6675674" cy="2443948"/>
+            <a:chOff x="5345752" y="4239245"/>
+            <a:chExt cx="6675674" cy="2443948"/>
+          </a:xfrm>
+        </p:grpSpPr>
+        <p:pic>
+          <p:nvPicPr>
+            <p:cNvPr id="7" name="Content Placeholder 12">
+              <a:extLst>
+                <a:ext uri="{FF2B5EF4-FFF2-40B4-BE49-F238E27FC236}">
+                  <a16:creationId xmlns:a16="http://schemas.microsoft.com/office/drawing/2014/main" id="{FE7F8A51-9B23-4BA8-AF50-67B762FC2BC3}"/>
+                </a:ext>
+              </a:extLst>
+            </p:cNvPr>
+            <p:cNvPicPr>
+              <a:picLocks noChangeAspect="1"/>
+            </p:cNvPicPr>
+            <p:nvPr/>
+          </p:nvPicPr>
+          <p:blipFill>
+            <a:blip r:embed="rId2"/>
+            <a:stretch>
+              <a:fillRect/>
+            </a:stretch>
+          </p:blipFill>
+          <p:spPr>
+            <a:xfrm>
+              <a:off x="5345752" y="4239245"/>
+              <a:ext cx="4779963" cy="2443948"/>
+            </a:xfrm>
+            <a:prstGeom prst="rect">
+              <a:avLst/>
+            </a:prstGeom>
+          </p:spPr>
+        </p:pic>
+        <p:sp>
+          <p:nvSpPr>
+            <p:cNvPr id="9" name="TextBox 8">
+              <a:extLst>
+                <a:ext uri="{FF2B5EF4-FFF2-40B4-BE49-F238E27FC236}">
+                  <a16:creationId xmlns:a16="http://schemas.microsoft.com/office/drawing/2014/main" id="{B4E726D8-E408-4C2E-AAF0-D4CFBBC36AC4}"/>
+                </a:ext>
+              </a:extLst>
+            </p:cNvPr>
+            <p:cNvSpPr txBox="1"/>
+            <p:nvPr/>
+          </p:nvSpPr>
+          <p:spPr>
+            <a:xfrm>
+              <a:off x="9768998" y="4820974"/>
+              <a:ext cx="2252428" cy="1200329"/>
+            </a:xfrm>
+            <a:prstGeom prst="rect">
+              <a:avLst/>
+            </a:prstGeom>
+            <a:noFill/>
+          </p:spPr>
+          <p:txBody>
+            <a:bodyPr wrap="square">
+              <a:spAutoFit/>
+            </a:bodyPr>
+            <a:lstStyle/>
+            <a:p>
+              <a:pPr lvl="1" algn="ctr"/>
+              <a:r>
+                <a:rPr lang="en-US" dirty="0"/>
+                <a:t>Market Quartiles:</a:t>
+              </a:r>
+            </a:p>
+            <a:p>
+              <a:pPr lvl="1" algn="ctr"/>
+              <a:r>
+                <a:rPr lang="en-US" dirty="0"/>
+                <a:t> 19, 32, 55 </a:t>
+              </a:r>
+            </a:p>
+            <a:p>
+              <a:pPr lvl="1" algn="ctr"/>
+              <a:r>
+                <a:rPr lang="en-US" dirty="0"/>
+                <a:t>Big Mountain: 105</a:t>
+              </a:r>
+            </a:p>
+          </p:txBody>
+        </p:sp>
+      </p:grpSp>
+      <p:grpSp>
+        <p:nvGrpSpPr>
+          <p:cNvPr id="5" name="Group 4">
+            <a:extLst>
+              <a:ext uri="{FF2B5EF4-FFF2-40B4-BE49-F238E27FC236}">
+                <a16:creationId xmlns:a16="http://schemas.microsoft.com/office/drawing/2014/main" id="{AD6F376B-B8A9-49AA-8B58-2833BC46DE2C}"/>
+              </a:ext>
+            </a:extLst>
+          </p:cNvPr>
+          <p:cNvGrpSpPr/>
+          <p:nvPr/>
+        </p:nvGrpSpPr>
+        <p:grpSpPr>
+          <a:xfrm>
+            <a:off x="5353689" y="1693316"/>
+            <a:ext cx="6649408" cy="2431908"/>
+            <a:chOff x="5353689" y="1693316"/>
+            <a:chExt cx="6649408" cy="2431908"/>
+          </a:xfrm>
+        </p:grpSpPr>
+        <p:pic>
+          <p:nvPicPr>
+            <p:cNvPr id="8" name="Content Placeholder 15">
+              <a:extLst>
+                <a:ext uri="{FF2B5EF4-FFF2-40B4-BE49-F238E27FC236}">
+                  <a16:creationId xmlns:a16="http://schemas.microsoft.com/office/drawing/2014/main" id="{0801A880-12DB-41EE-B26B-3CCD120F9884}"/>
+                </a:ext>
+              </a:extLst>
+            </p:cNvPr>
+            <p:cNvPicPr>
+              <a:picLocks noChangeAspect="1"/>
+            </p:cNvPicPr>
+            <p:nvPr/>
+          </p:nvPicPr>
+          <p:blipFill>
+            <a:blip r:embed="rId3"/>
+            <a:stretch>
+              <a:fillRect/>
+            </a:stretch>
+          </p:blipFill>
+          <p:spPr>
+            <a:xfrm>
+              <a:off x="5353689" y="1693316"/>
+              <a:ext cx="4764087" cy="2431908"/>
+            </a:xfrm>
+            <a:prstGeom prst="rect">
+              <a:avLst/>
+            </a:prstGeom>
+            <a:effectLst>
+              <a:outerShdw blurRad="25400" dir="17880000">
+                <a:srgbClr val="000000">
+                  <a:alpha val="46000"/>
+                </a:srgbClr>
+              </a:outerShdw>
+            </a:effectLst>
+          </p:spPr>
+        </p:pic>
+        <p:sp>
+          <p:nvSpPr>
+            <p:cNvPr id="13" name="TextBox 12">
+              <a:extLst>
+                <a:ext uri="{FF2B5EF4-FFF2-40B4-BE49-F238E27FC236}">
+                  <a16:creationId xmlns:a16="http://schemas.microsoft.com/office/drawing/2014/main" id="{86DFBBFB-4642-48DF-A491-56A116FC59E9}"/>
+                </a:ext>
+              </a:extLst>
+            </p:cNvPr>
+            <p:cNvSpPr txBox="1"/>
+            <p:nvPr/>
+          </p:nvSpPr>
+          <p:spPr>
+            <a:xfrm>
+              <a:off x="9750669" y="2179314"/>
+              <a:ext cx="2252428" cy="1200329"/>
+            </a:xfrm>
+            <a:prstGeom prst="rect">
+              <a:avLst/>
+            </a:prstGeom>
+            <a:noFill/>
+          </p:spPr>
+          <p:txBody>
+            <a:bodyPr wrap="square">
+              <a:spAutoFit/>
+            </a:bodyPr>
+            <a:lstStyle/>
+            <a:p>
+              <a:pPr lvl="1" algn="ctr"/>
+              <a:r>
+                <a:rPr lang="en-US" dirty="0"/>
+                <a:t>Market Quartiles:</a:t>
+              </a:r>
+            </a:p>
+            <a:p>
+              <a:pPr lvl="1" algn="ctr"/>
+              <a:r>
+                <a:rPr lang="en-US" dirty="0"/>
+                <a:t> 47, 60, 78 </a:t>
+              </a:r>
+            </a:p>
+            <a:p>
+              <a:pPr lvl="1" algn="ctr"/>
+              <a:r>
+                <a:rPr lang="en-US" dirty="0"/>
+                <a:t>Big Mountain:</a:t>
+              </a:r>
+            </a:p>
+            <a:p>
+              <a:pPr lvl="1" algn="ctr"/>
+              <a:r>
+                <a:rPr lang="en-US" dirty="0"/>
+                <a:t>81</a:t>
+              </a:r>
+            </a:p>
+          </p:txBody>
+        </p:sp>
+      </p:grpSp>
     </p:spTree>
     <p:extLst>
       <p:ext uri="{BB962C8B-B14F-4D97-AF65-F5344CB8AC3E}">
@@ -10377,24 +10704,6 @@
 </file>
 
 <file path=customXml/item1.xml><?xml version="1.0" encoding="utf-8"?>
-<?mso-contentType ?>
-<FormTemplates xmlns="http://schemas.microsoft.com/sharepoint/v3/contenttype/forms">
-  <Display>DocumentLibraryForm</Display>
-  <Edit>DocumentLibraryForm</Edit>
-  <New>DocumentLibraryForm</New>
-</FormTemplates>
-</file>
-
-<file path=customXml/item2.xml><?xml version="1.0" encoding="utf-8"?>
-<p:properties xmlns:p="http://schemas.microsoft.com/office/2006/metadata/properties" xmlns:xsi="http://www.w3.org/2001/XMLSchema-instance" xmlns:pc="http://schemas.microsoft.com/office/infopath/2007/PartnerControls">
-  <documentManagement>
-    <Status xmlns="71af3243-3dd4-4a8d-8c0d-dd76da1f02a5">Not started</Status>
-    <MediaServiceKeyPoints xmlns="71af3243-3dd4-4a8d-8c0d-dd76da1f02a5" xsi:nil="true"/>
-  </documentManagement>
-</p:properties>
-</file>
-
-<file path=customXml/item3.xml><?xml version="1.0" encoding="utf-8"?>
 <ct:contentTypeSchema xmlns:ct="http://schemas.microsoft.com/office/2006/metadata/contentType" xmlns:ma="http://schemas.microsoft.com/office/2006/metadata/properties/metaAttributes" ct:_="" ma:_="" ma:contentTypeName="Document" ma:contentTypeID="0x01010079F111ED35F8CC479449609E8A0923A6" ma:contentTypeVersion="12" ma:contentTypeDescription="Create a new document." ma:contentTypeScope="" ma:versionID="a410dd7f93c95333ffa1b60ed6adedd1">
   <xsd:schema xmlns:xsd="http://www.w3.org/2001/XMLSchema" xmlns:xs="http://www.w3.org/2001/XMLSchema" xmlns:p="http://schemas.microsoft.com/office/2006/metadata/properties" xmlns:ns2="71af3243-3dd4-4a8d-8c0d-dd76da1f02a5" xmlns:ns3="16c05727-aa75-4e4a-9b5f-8a80a1165891" targetNamespace="http://schemas.microsoft.com/office/2006/metadata/properties" ma:root="true" ma:fieldsID="a936d9baba76aa3866493feff160faab" ns2:_="" ns3:_="">
     <xsd:import namespace="71af3243-3dd4-4a8d-8c0d-dd76da1f02a5"/>
@@ -10615,25 +10924,25 @@
 </ct:contentTypeSchema>
 </file>
 
-<file path=customXml/itemProps1.xml><?xml version="1.0" encoding="utf-8"?>
-<ds:datastoreItem xmlns:ds="http://schemas.openxmlformats.org/officeDocument/2006/customXml" ds:itemID="{64B270AB-C138-415C-897E-3C24487DECF1}">
-  <ds:schemaRefs>
-    <ds:schemaRef ds:uri="http://schemas.microsoft.com/sharepoint/v3/contenttype/forms"/>
-  </ds:schemaRefs>
-</ds:datastoreItem>
+<file path=customXml/item2.xml><?xml version="1.0" encoding="utf-8"?>
+<p:properties xmlns:p="http://schemas.microsoft.com/office/2006/metadata/properties" xmlns:xsi="http://www.w3.org/2001/XMLSchema-instance" xmlns:pc="http://schemas.microsoft.com/office/infopath/2007/PartnerControls">
+  <documentManagement>
+    <Status xmlns="71af3243-3dd4-4a8d-8c0d-dd76da1f02a5">Not started</Status>
+    <MediaServiceKeyPoints xmlns="71af3243-3dd4-4a8d-8c0d-dd76da1f02a5" xsi:nil="true"/>
+  </documentManagement>
+</p:properties>
 </file>
 
-<file path=customXml/itemProps2.xml><?xml version="1.0" encoding="utf-8"?>
-<ds:datastoreItem xmlns:ds="http://schemas.openxmlformats.org/officeDocument/2006/customXml" ds:itemID="{2C4C00F4-06E9-43E3-AD97-88A857CEFA82}">
-  <ds:schemaRefs>
-    <ds:schemaRef ds:uri="http://schemas.microsoft.com/office/2006/metadata/properties"/>
-    <ds:schemaRef ds:uri="http://schemas.microsoft.com/office/infopath/2007/PartnerControls"/>
-    <ds:schemaRef ds:uri="71af3243-3dd4-4a8d-8c0d-dd76da1f02a5"/>
-  </ds:schemaRefs>
-</ds:datastoreItem>
+<file path=customXml/item3.xml><?xml version="1.0" encoding="utf-8"?>
+<?mso-contentType ?>
+<FormTemplates xmlns="http://schemas.microsoft.com/sharepoint/v3/contenttype/forms">
+  <Display>DocumentLibraryForm</Display>
+  <Edit>DocumentLibraryForm</Edit>
+  <New>DocumentLibraryForm</New>
+</FormTemplates>
 </file>
 
-<file path=customXml/itemProps3.xml><?xml version="1.0" encoding="utf-8"?>
+<file path=customXml/itemProps1.xml><?xml version="1.0" encoding="utf-8"?>
 <ds:datastoreItem xmlns:ds="http://schemas.openxmlformats.org/officeDocument/2006/customXml" ds:itemID="{0585E981-8C91-4205-A0C3-C991F42B4C9E}">
   <ds:schemaRefs>
     <ds:schemaRef ds:uri="http://schemas.microsoft.com/office/2006/metadata/contentType"/>
@@ -10650,4 +10959,22 @@
     <ds:schemaRef ds:uri="http://schemas.microsoft.com/internal/obd"/>
   </ds:schemaRefs>
 </ds:datastoreItem>
+</file>
+
+<file path=customXml/itemProps2.xml><?xml version="1.0" encoding="utf-8"?>
+<ds:datastoreItem xmlns:ds="http://schemas.openxmlformats.org/officeDocument/2006/customXml" ds:itemID="{2C4C00F4-06E9-43E3-AD97-88A857CEFA82}">
+  <ds:schemaRefs>
+    <ds:schemaRef ds:uri="http://schemas.microsoft.com/office/2006/metadata/properties"/>
+    <ds:schemaRef ds:uri="http://schemas.microsoft.com/office/infopath/2007/PartnerControls"/>
+    <ds:schemaRef ds:uri="71af3243-3dd4-4a8d-8c0d-dd76da1f02a5"/>
+  </ds:schemaRefs>
+</ds:datastoreItem>
+</file>
+
+<file path=customXml/itemProps3.xml><?xml version="1.0" encoding="utf-8"?>
+<ds:datastoreItem xmlns:ds="http://schemas.openxmlformats.org/officeDocument/2006/customXml" ds:itemID="{64B270AB-C138-415C-897E-3C24487DECF1}">
+  <ds:schemaRefs>
+    <ds:schemaRef ds:uri="http://schemas.microsoft.com/sharepoint/v3/contenttype/forms"/>
+  </ds:schemaRefs>
+</ds:datastoreItem>
 </file>
</xml_diff>

<commit_message>
Minor Updates to Presentation & Report
</commit_message>
<xml_diff>
--- a/Reports/Guided Capstone Presentation.pptx
+++ b/Reports/Guided Capstone Presentation.pptx
@@ -6340,7 +6340,7 @@
           </a:effectLst>
           <a:extLst>
             <a:ext uri="{91240B29-F687-4f45-9708-019B960494DF}">
-              <a14:hiddenLine xmlns="" xmlns:a14="http://schemas.microsoft.com/office/drawing/2010/main" xmlns:p14="http://schemas.microsoft.com/office/powerpoint/2010/main" xmlns:a16="http://schemas.microsoft.com/office/drawing/2014/main" w="9525">
+              <a14:hiddenLine xmlns:a16="http://schemas.microsoft.com/office/drawing/2014/main" xmlns:p14="http://schemas.microsoft.com/office/powerpoint/2010/main" xmlns:a14="http://schemas.microsoft.com/office/drawing/2010/main" xmlns="" w="9525">
                 <a:solidFill>
                   <a:srgbClr val="000000"/>
                 </a:solidFill>
@@ -6803,7 +6803,19 @@
               <a:rPr lang="en-US" sz="2400" b="1" dirty="0">
                 <a:latin typeface="Abadi" panose="020B0604020104020204" pitchFamily="34" charset="0"/>
               </a:rPr>
-              <a:t>Dataset on ski facilities across the US</a:t>
+              <a:t>Dataset </a:t>
+            </a:r>
+            <a:r>
+              <a:rPr lang="en-US" sz="2400" b="1">
+                <a:latin typeface="Abadi" panose="020B0604020104020204" pitchFamily="34" charset="0"/>
+              </a:rPr>
+              <a:t>on 336 ski </a:t>
+            </a:r>
+            <a:r>
+              <a:rPr lang="en-US" sz="2400" b="1" dirty="0">
+                <a:latin typeface="Abadi" panose="020B0604020104020204" pitchFamily="34" charset="0"/>
+              </a:rPr>
+              <a:t>facilities across the US</a:t>
             </a:r>
           </a:p>
         </p:txBody>
@@ -10704,6 +10716,24 @@
 </file>
 
 <file path=customXml/item1.xml><?xml version="1.0" encoding="utf-8"?>
+<?mso-contentType ?>
+<FormTemplates xmlns="http://schemas.microsoft.com/sharepoint/v3/contenttype/forms">
+  <Display>DocumentLibraryForm</Display>
+  <Edit>DocumentLibraryForm</Edit>
+  <New>DocumentLibraryForm</New>
+</FormTemplates>
+</file>
+
+<file path=customXml/item2.xml><?xml version="1.0" encoding="utf-8"?>
+<p:properties xmlns:p="http://schemas.microsoft.com/office/2006/metadata/properties" xmlns:xsi="http://www.w3.org/2001/XMLSchema-instance" xmlns:pc="http://schemas.microsoft.com/office/infopath/2007/PartnerControls">
+  <documentManagement>
+    <Status xmlns="71af3243-3dd4-4a8d-8c0d-dd76da1f02a5">Not started</Status>
+    <MediaServiceKeyPoints xmlns="71af3243-3dd4-4a8d-8c0d-dd76da1f02a5" xsi:nil="true"/>
+  </documentManagement>
+</p:properties>
+</file>
+
+<file path=customXml/item3.xml><?xml version="1.0" encoding="utf-8"?>
 <ct:contentTypeSchema xmlns:ct="http://schemas.microsoft.com/office/2006/metadata/contentType" xmlns:ma="http://schemas.microsoft.com/office/2006/metadata/properties/metaAttributes" ct:_="" ma:_="" ma:contentTypeName="Document" ma:contentTypeID="0x01010079F111ED35F8CC479449609E8A0923A6" ma:contentTypeVersion="12" ma:contentTypeDescription="Create a new document." ma:contentTypeScope="" ma:versionID="a410dd7f93c95333ffa1b60ed6adedd1">
   <xsd:schema xmlns:xsd="http://www.w3.org/2001/XMLSchema" xmlns:xs="http://www.w3.org/2001/XMLSchema" xmlns:p="http://schemas.microsoft.com/office/2006/metadata/properties" xmlns:ns2="71af3243-3dd4-4a8d-8c0d-dd76da1f02a5" xmlns:ns3="16c05727-aa75-4e4a-9b5f-8a80a1165891" targetNamespace="http://schemas.microsoft.com/office/2006/metadata/properties" ma:root="true" ma:fieldsID="a936d9baba76aa3866493feff160faab" ns2:_="" ns3:_="">
     <xsd:import namespace="71af3243-3dd4-4a8d-8c0d-dd76da1f02a5"/>
@@ -10924,25 +10954,25 @@
 </ct:contentTypeSchema>
 </file>
 
-<file path=customXml/item2.xml><?xml version="1.0" encoding="utf-8"?>
-<p:properties xmlns:p="http://schemas.microsoft.com/office/2006/metadata/properties" xmlns:xsi="http://www.w3.org/2001/XMLSchema-instance" xmlns:pc="http://schemas.microsoft.com/office/infopath/2007/PartnerControls">
-  <documentManagement>
-    <Status xmlns="71af3243-3dd4-4a8d-8c0d-dd76da1f02a5">Not started</Status>
-    <MediaServiceKeyPoints xmlns="71af3243-3dd4-4a8d-8c0d-dd76da1f02a5" xsi:nil="true"/>
-  </documentManagement>
-</p:properties>
+<file path=customXml/itemProps1.xml><?xml version="1.0" encoding="utf-8"?>
+<ds:datastoreItem xmlns:ds="http://schemas.openxmlformats.org/officeDocument/2006/customXml" ds:itemID="{64B270AB-C138-415C-897E-3C24487DECF1}">
+  <ds:schemaRefs>
+    <ds:schemaRef ds:uri="http://schemas.microsoft.com/sharepoint/v3/contenttype/forms"/>
+  </ds:schemaRefs>
+</ds:datastoreItem>
 </file>
 
-<file path=customXml/item3.xml><?xml version="1.0" encoding="utf-8"?>
-<?mso-contentType ?>
-<FormTemplates xmlns="http://schemas.microsoft.com/sharepoint/v3/contenttype/forms">
-  <Display>DocumentLibraryForm</Display>
-  <Edit>DocumentLibraryForm</Edit>
-  <New>DocumentLibraryForm</New>
-</FormTemplates>
+<file path=customXml/itemProps2.xml><?xml version="1.0" encoding="utf-8"?>
+<ds:datastoreItem xmlns:ds="http://schemas.openxmlformats.org/officeDocument/2006/customXml" ds:itemID="{2C4C00F4-06E9-43E3-AD97-88A857CEFA82}">
+  <ds:schemaRefs>
+    <ds:schemaRef ds:uri="http://schemas.microsoft.com/office/2006/metadata/properties"/>
+    <ds:schemaRef ds:uri="http://schemas.microsoft.com/office/infopath/2007/PartnerControls"/>
+    <ds:schemaRef ds:uri="71af3243-3dd4-4a8d-8c0d-dd76da1f02a5"/>
+  </ds:schemaRefs>
+</ds:datastoreItem>
 </file>
 
-<file path=customXml/itemProps1.xml><?xml version="1.0" encoding="utf-8"?>
+<file path=customXml/itemProps3.xml><?xml version="1.0" encoding="utf-8"?>
 <ds:datastoreItem xmlns:ds="http://schemas.openxmlformats.org/officeDocument/2006/customXml" ds:itemID="{0585E981-8C91-4205-A0C3-C991F42B4C9E}">
   <ds:schemaRefs>
     <ds:schemaRef ds:uri="http://schemas.microsoft.com/office/2006/metadata/contentType"/>
@@ -10959,22 +10989,4 @@
     <ds:schemaRef ds:uri="http://schemas.microsoft.com/internal/obd"/>
   </ds:schemaRefs>
 </ds:datastoreItem>
-</file>
-
-<file path=customXml/itemProps2.xml><?xml version="1.0" encoding="utf-8"?>
-<ds:datastoreItem xmlns:ds="http://schemas.openxmlformats.org/officeDocument/2006/customXml" ds:itemID="{2C4C00F4-06E9-43E3-AD97-88A857CEFA82}">
-  <ds:schemaRefs>
-    <ds:schemaRef ds:uri="http://schemas.microsoft.com/office/2006/metadata/properties"/>
-    <ds:schemaRef ds:uri="http://schemas.microsoft.com/office/infopath/2007/PartnerControls"/>
-    <ds:schemaRef ds:uri="71af3243-3dd4-4a8d-8c0d-dd76da1f02a5"/>
-  </ds:schemaRefs>
-</ds:datastoreItem>
-</file>
-
-<file path=customXml/itemProps3.xml><?xml version="1.0" encoding="utf-8"?>
-<ds:datastoreItem xmlns:ds="http://schemas.openxmlformats.org/officeDocument/2006/customXml" ds:itemID="{64B270AB-C138-415C-897E-3C24487DECF1}">
-  <ds:schemaRefs>
-    <ds:schemaRef ds:uri="http://schemas.microsoft.com/sharepoint/v3/contenttype/forms"/>
-  </ds:schemaRefs>
-</ds:datastoreItem>
 </file>
</xml_diff>